<commit_message>
Ajout du modèle de connaissance (MCC)
</commit_message>
<xml_diff>
--- a/ModelisationMultiphysique/ModelisationMultiphysique.pptx
+++ b/ModelisationMultiphysique/ModelisationMultiphysique.pptx
@@ -5,34 +5,38 @@
     <p:sldMasterId id="2147483804" r:id="rId1"/>
   </p:sldMasterIdLst>
   <p:notesMasterIdLst>
-    <p:notesMasterId r:id="rId27"/>
+    <p:notesMasterId r:id="rId31"/>
   </p:notesMasterIdLst>
   <p:sldIdLst>
     <p:sldId id="256" r:id="rId2"/>
     <p:sldId id="282" r:id="rId3"/>
     <p:sldId id="281" r:id="rId4"/>
     <p:sldId id="263" r:id="rId5"/>
-    <p:sldId id="272" r:id="rId6"/>
-    <p:sldId id="273" r:id="rId7"/>
-    <p:sldId id="274" r:id="rId8"/>
-    <p:sldId id="276" r:id="rId9"/>
-    <p:sldId id="277" r:id="rId10"/>
-    <p:sldId id="271" r:id="rId11"/>
-    <p:sldId id="278" r:id="rId12"/>
-    <p:sldId id="279" r:id="rId13"/>
-    <p:sldId id="275" r:id="rId14"/>
-    <p:sldId id="259" r:id="rId15"/>
-    <p:sldId id="260" r:id="rId16"/>
-    <p:sldId id="261" r:id="rId17"/>
-    <p:sldId id="280" r:id="rId18"/>
-    <p:sldId id="262" r:id="rId19"/>
-    <p:sldId id="265" r:id="rId20"/>
-    <p:sldId id="267" r:id="rId21"/>
-    <p:sldId id="268" r:id="rId22"/>
-    <p:sldId id="269" r:id="rId23"/>
-    <p:sldId id="270" r:id="rId24"/>
-    <p:sldId id="264" r:id="rId25"/>
-    <p:sldId id="266" r:id="rId26"/>
+    <p:sldId id="273" r:id="rId6"/>
+    <p:sldId id="272" r:id="rId7"/>
+    <p:sldId id="283" r:id="rId8"/>
+    <p:sldId id="286" r:id="rId9"/>
+    <p:sldId id="284" r:id="rId10"/>
+    <p:sldId id="285" r:id="rId11"/>
+    <p:sldId id="274" r:id="rId12"/>
+    <p:sldId id="276" r:id="rId13"/>
+    <p:sldId id="277" r:id="rId14"/>
+    <p:sldId id="271" r:id="rId15"/>
+    <p:sldId id="278" r:id="rId16"/>
+    <p:sldId id="279" r:id="rId17"/>
+    <p:sldId id="275" r:id="rId18"/>
+    <p:sldId id="259" r:id="rId19"/>
+    <p:sldId id="260" r:id="rId20"/>
+    <p:sldId id="261" r:id="rId21"/>
+    <p:sldId id="280" r:id="rId22"/>
+    <p:sldId id="262" r:id="rId23"/>
+    <p:sldId id="265" r:id="rId24"/>
+    <p:sldId id="267" r:id="rId25"/>
+    <p:sldId id="268" r:id="rId26"/>
+    <p:sldId id="269" r:id="rId27"/>
+    <p:sldId id="270" r:id="rId28"/>
+    <p:sldId id="264" r:id="rId29"/>
+    <p:sldId id="266" r:id="rId30"/>
   </p:sldIdLst>
   <p:sldSz cx="9144000" cy="6858000" type="screen4x3"/>
   <p:notesSz cx="6858000" cy="9144000"/>
@@ -216,7 +220,7 @@
           <a:p>
             <a:fld id="{39C4ABE7-6968-4EF3-8008-B142D354329E}" type="datetimeFigureOut">
               <a:rPr lang="fr-FR" smtClean="0"/>
-              <a:t>29/01/2014</a:t>
+              <a:t>30/01/2014</a:t>
             </a:fld>
             <a:endParaRPr lang="fr-FR"/>
           </a:p>
@@ -621,7 +625,7 @@
           <a:p>
             <a:fld id="{B4549172-3FEE-47D0-BB65-1A18684F7B98}" type="datetime1">
               <a:rPr lang="fr-FR" smtClean="0"/>
-              <a:t>29/01/2014</a:t>
+              <a:t>30/01/2014</a:t>
             </a:fld>
             <a:endParaRPr lang="fr-FR"/>
           </a:p>
@@ -1490,7 +1494,7 @@
           <a:p>
             <a:fld id="{0688EC1D-1471-4698-BCB8-4CF0BC090325}" type="datetime1">
               <a:rPr lang="fr-FR" smtClean="0"/>
-              <a:t>29/01/2014</a:t>
+              <a:t>30/01/2014</a:t>
             </a:fld>
             <a:endParaRPr lang="fr-FR"/>
           </a:p>
@@ -1665,7 +1669,7 @@
           <a:p>
             <a:fld id="{34F453BD-45AF-4B4E-99AC-6020FBB0AF33}" type="datetime1">
               <a:rPr lang="fr-FR" smtClean="0"/>
-              <a:t>29/01/2014</a:t>
+              <a:t>30/01/2014</a:t>
             </a:fld>
             <a:endParaRPr lang="fr-FR"/>
           </a:p>
@@ -1835,7 +1839,7 @@
           <a:p>
             <a:fld id="{FEB61240-9CB5-48EB-BBA6-3C19629F7658}" type="datetime1">
               <a:rPr lang="fr-FR" smtClean="0"/>
-              <a:t>29/01/2014</a:t>
+              <a:t>30/01/2014</a:t>
             </a:fld>
             <a:endParaRPr lang="fr-FR"/>
           </a:p>
@@ -2045,7 +2049,7 @@
           <a:p>
             <a:fld id="{2BAACD1D-30C3-476D-A850-5E16ED207568}" type="datetime1">
               <a:rPr lang="fr-FR" smtClean="0"/>
-              <a:t>29/01/2014</a:t>
+              <a:t>30/01/2014</a:t>
             </a:fld>
             <a:endParaRPr lang="fr-FR"/>
           </a:p>
@@ -2859,7 +2863,7 @@
           <a:p>
             <a:fld id="{B9694703-0C5B-4AFF-B4BE-E07D7CDC5B14}" type="datetime1">
               <a:rPr lang="fr-FR" smtClean="0"/>
-              <a:t>29/01/2014</a:t>
+              <a:t>30/01/2014</a:t>
             </a:fld>
             <a:endParaRPr lang="fr-FR"/>
           </a:p>
@@ -3095,7 +3099,7 @@
           <a:p>
             <a:fld id="{37245C4D-23E6-48C4-9F30-3F474E6D101F}" type="datetime1">
               <a:rPr lang="fr-FR" smtClean="0"/>
-              <a:t>29/01/2014</a:t>
+              <a:t>30/01/2014</a:t>
             </a:fld>
             <a:endParaRPr lang="fr-FR"/>
           </a:p>
@@ -3418,7 +3422,7 @@
           <a:p>
             <a:fld id="{A3E5E471-8E97-4CF8-A94F-AB51374CF764}" type="datetime1">
               <a:rPr lang="fr-FR" smtClean="0"/>
-              <a:t>29/01/2014</a:t>
+              <a:t>30/01/2014</a:t>
             </a:fld>
             <a:endParaRPr lang="fr-FR"/>
           </a:p>
@@ -3508,7 +3512,7 @@
           <a:p>
             <a:fld id="{6A8C3648-6B48-4061-B02D-C97909C99497}" type="datetime1">
               <a:rPr lang="fr-FR" smtClean="0"/>
-              <a:t>29/01/2014</a:t>
+              <a:t>30/01/2014</a:t>
             </a:fld>
             <a:endParaRPr lang="fr-FR"/>
           </a:p>
@@ -4025,7 +4029,7 @@
           <a:p>
             <a:fld id="{B2A6E1C4-077A-4686-B4A8-84EDB76D0538}" type="datetime1">
               <a:rPr lang="fr-FR" smtClean="0"/>
-              <a:t>29/01/2014</a:t>
+              <a:t>30/01/2014</a:t>
             </a:fld>
             <a:endParaRPr lang="fr-FR"/>
           </a:p>
@@ -4536,7 +4540,7 @@
           <a:p>
             <a:fld id="{B2A3A41F-5CC8-4B2F-A21F-2E1DB772744F}" type="datetime1">
               <a:rPr lang="fr-FR" smtClean="0"/>
-              <a:t>29/01/2014</a:t>
+              <a:t>30/01/2014</a:t>
             </a:fld>
             <a:endParaRPr lang="fr-FR"/>
           </a:p>
@@ -4781,7 +4785,7 @@
           <a:p>
             <a:fld id="{85C30354-83D0-4C08-BE63-E487BB73E13E}" type="datetime1">
               <a:rPr lang="fr-FR" smtClean="0"/>
-              <a:t>29/01/2014</a:t>
+              <a:t>30/01/2014</a:t>
             </a:fld>
             <a:endParaRPr lang="fr-FR"/>
           </a:p>
@@ -5517,7 +5521,7 @@
       </p:grpSpPr>
       <p:sp>
         <p:nvSpPr>
-          <p:cNvPr id="4" name="Titre 3"/>
+          <p:cNvPr id="2" name="Titre 1"/>
           <p:cNvSpPr>
             <a:spLocks noGrp="1"/>
           </p:cNvSpPr>
@@ -5527,36 +5531,44 @@
         </p:nvSpPr>
         <p:spPr/>
         <p:txBody>
+          <a:bodyPr>
+            <a:normAutofit fontScale="90000"/>
+          </a:bodyPr>
+          <a:lstStyle/>
+          <a:p>
+            <a:r>
+              <a:rPr lang="fr-FR" dirty="0" smtClean="0"/>
+              <a:t>Modélisation multiphysique</a:t>
+            </a:r>
+            <a:br>
+              <a:rPr lang="fr-FR" dirty="0" smtClean="0"/>
+            </a:br>
+            <a:r>
+              <a:rPr lang="fr-FR" dirty="0" smtClean="0"/>
+              <a:t>Enjeux</a:t>
+            </a:r>
+            <a:endParaRPr lang="fr-FR" dirty="0"/>
+          </a:p>
+        </p:txBody>
+      </p:sp>
+      <p:sp>
+        <p:nvSpPr>
+          <p:cNvPr id="3" name="Espace réservé du contenu 2"/>
+          <p:cNvSpPr>
+            <a:spLocks noGrp="1"/>
+          </p:cNvSpPr>
+          <p:nvPr>
+            <p:ph sz="quarter" idx="1"/>
+          </p:nvPr>
+        </p:nvSpPr>
+        <p:spPr/>
+        <p:txBody>
           <a:bodyPr/>
           <a:lstStyle/>
           <a:p>
             <a:r>
-              <a:rPr lang="fr-FR" dirty="0" err="1" smtClean="0"/>
-              <a:t>Scilab</a:t>
-            </a:r>
-            <a:r>
-              <a:rPr lang="fr-FR" dirty="0" smtClean="0"/>
-              <a:t>, </a:t>
-            </a:r>
-            <a:r>
-              <a:rPr lang="fr-FR" dirty="0" err="1" smtClean="0"/>
-              <a:t>Matlab</a:t>
-            </a:r>
-            <a:r>
-              <a:rPr lang="fr-FR" dirty="0" smtClean="0"/>
-              <a:t>, Simulink, </a:t>
-            </a:r>
-            <a:r>
-              <a:rPr lang="fr-FR" dirty="0" err="1" smtClean="0"/>
-              <a:t>Xcos</a:t>
-            </a:r>
-            <a:r>
-              <a:rPr lang="fr-FR" dirty="0" smtClean="0"/>
-              <a:t>, </a:t>
-            </a:r>
-            <a:r>
-              <a:rPr lang="fr-FR" dirty="0" err="1" smtClean="0"/>
-              <a:t>Modelica</a:t>
+              <a:rPr lang="fr-FR" dirty="0" smtClean="0"/>
+              <a:t>Pouvoir simuler le comportement d’un système dans sa globalité </a:t>
             </a:r>
             <a:endParaRPr lang="fr-FR" dirty="0"/>
           </a:p>
@@ -5564,35 +5576,12 @@
       </p:sp>
       <p:sp>
         <p:nvSpPr>
-          <p:cNvPr id="5" name="Espace réservé du texte 4"/>
-          <p:cNvSpPr>
-            <a:spLocks noGrp="1"/>
-          </p:cNvSpPr>
-          <p:nvPr>
-            <p:ph type="body" idx="1"/>
-          </p:nvPr>
-        </p:nvSpPr>
-        <p:spPr/>
-        <p:txBody>
-          <a:bodyPr/>
-          <a:lstStyle/>
-          <a:p>
-            <a:r>
-              <a:rPr lang="fr-FR" dirty="0" smtClean="0"/>
-              <a:t>Qu’est ce que c’est tout ça ?</a:t>
-            </a:r>
-            <a:endParaRPr lang="fr-FR" dirty="0"/>
-          </a:p>
-        </p:txBody>
-      </p:sp>
-      <p:sp>
-        <p:nvSpPr>
-          <p:cNvPr id="6" name="Espace réservé du numéro de diapositive 5"/>
-          <p:cNvSpPr>
-            <a:spLocks noGrp="1"/>
-          </p:cNvSpPr>
-          <p:nvPr>
-            <p:ph type="sldNum" sz="quarter" idx="12"/>
+          <p:cNvPr id="4" name="Espace réservé du numéro de diapositive 3"/>
+          <p:cNvSpPr>
+            <a:spLocks noGrp="1"/>
+          </p:cNvSpPr>
+          <p:nvPr>
+            <p:ph type="sldNum" sz="quarter" idx="15"/>
           </p:nvPr>
         </p:nvSpPr>
         <p:spPr/>
@@ -5611,7 +5600,7 @@
     </p:spTree>
     <p:extLst>
       <p:ext uri="{BB962C8B-B14F-4D97-AF65-F5344CB8AC3E}">
-        <p14:creationId xmlns:p14="http://schemas.microsoft.com/office/powerpoint/2010/main" val="3489141374"/>
+        <p14:creationId xmlns:p14="http://schemas.microsoft.com/office/powerpoint/2010/main" val="3490192258"/>
       </p:ext>
     </p:extLst>
   </p:cSld>
@@ -5640,7 +5629,7 @@
       </p:grpSpPr>
       <p:sp>
         <p:nvSpPr>
-          <p:cNvPr id="5" name="Titre 4"/>
+          <p:cNvPr id="2" name="Titre 1"/>
           <p:cNvSpPr>
             <a:spLocks noGrp="1"/>
           </p:cNvSpPr>
@@ -5650,110 +5639,102 @@
         </p:nvSpPr>
         <p:spPr/>
         <p:txBody>
+          <a:bodyPr>
+            <a:normAutofit fontScale="90000"/>
+          </a:bodyPr>
+          <a:lstStyle/>
+          <a:p>
+            <a:r>
+              <a:rPr lang="fr-FR" dirty="0" smtClean="0"/>
+              <a:t>Modélisation multiphysique</a:t>
+            </a:r>
+            <a:br>
+              <a:rPr lang="fr-FR" dirty="0" smtClean="0"/>
+            </a:br>
+            <a:r>
+              <a:rPr lang="fr-FR" dirty="0" smtClean="0"/>
+              <a:t>Problématiques</a:t>
+            </a:r>
+            <a:endParaRPr lang="fr-FR" dirty="0"/>
+          </a:p>
+        </p:txBody>
+      </p:sp>
+      <p:sp>
+        <p:nvSpPr>
+          <p:cNvPr id="3" name="Espace réservé du contenu 2"/>
+          <p:cNvSpPr>
+            <a:spLocks noGrp="1"/>
+          </p:cNvSpPr>
+          <p:nvPr>
+            <p:ph sz="quarter" idx="1"/>
+          </p:nvPr>
+        </p:nvSpPr>
+        <p:spPr/>
+        <p:txBody>
           <a:bodyPr/>
           <a:lstStyle/>
           <a:p>
             <a:r>
               <a:rPr lang="fr-FR" dirty="0" smtClean="0"/>
-              <a:t>Les logiciels de calcul numérique</a:t>
-            </a:r>
+              <a:t>Problèmes logiciels</a:t>
+            </a:r>
+          </a:p>
+          <a:p>
+            <a:pPr lvl="1"/>
+            <a:r>
+              <a:rPr lang="fr-FR" dirty="0" smtClean="0"/>
+              <a:t>Les logiciels utilisés de classiquement en SII sont orientés « </a:t>
+            </a:r>
+            <a:r>
+              <a:rPr lang="fr-FR" dirty="0" err="1" smtClean="0"/>
+              <a:t>monophysique</a:t>
+            </a:r>
+            <a:r>
+              <a:rPr lang="fr-FR" dirty="0" smtClean="0"/>
+              <a:t> ». Il faut donc utiliser des logiciels spécifiques.</a:t>
+            </a:r>
+          </a:p>
+          <a:p>
+            <a:pPr lvl="1"/>
             <a:endParaRPr lang="fr-FR" dirty="0"/>
           </a:p>
-        </p:txBody>
-      </p:sp>
-      <p:sp>
-        <p:nvSpPr>
-          <p:cNvPr id="6" name="Espace réservé du contenu 5"/>
-          <p:cNvSpPr>
-            <a:spLocks noGrp="1"/>
-          </p:cNvSpPr>
-          <p:nvPr>
-            <p:ph sz="quarter" idx="1"/>
-          </p:nvPr>
-        </p:nvSpPr>
-        <p:spPr/>
-        <p:txBody>
-          <a:bodyPr/>
-          <a:lstStyle/>
-          <a:p>
-            <a:r>
-              <a:rPr lang="fr-FR" dirty="0" smtClean="0"/>
-              <a:t>Parmi les logiciels de simulation numérique utilisés dans la recherche ou dans l’industrie on trouve </a:t>
-            </a:r>
-            <a:r>
-              <a:rPr lang="fr-FR" dirty="0" err="1" smtClean="0"/>
-              <a:t>Matlab</a:t>
-            </a:r>
-            <a:r>
-              <a:rPr lang="fr-FR" dirty="0" smtClean="0"/>
-              <a:t> et </a:t>
-            </a:r>
-            <a:r>
-              <a:rPr lang="fr-FR" dirty="0" err="1" smtClean="0"/>
-              <a:t>Scilab</a:t>
-            </a:r>
-            <a:r>
-              <a:rPr lang="fr-FR" dirty="0" smtClean="0"/>
-              <a:t>.</a:t>
+          <a:p>
+            <a:r>
+              <a:rPr lang="fr-FR" dirty="0" smtClean="0"/>
+              <a:t>Problèmes pour l’enseignant</a:t>
             </a:r>
           </a:p>
           <a:p>
             <a:pPr lvl="1"/>
             <a:r>
-              <a:rPr lang="fr-FR" dirty="0" err="1" smtClean="0"/>
-              <a:t>Matlab</a:t>
-            </a:r>
-            <a:r>
-              <a:rPr lang="fr-FR" dirty="0"/>
-              <a:t> </a:t>
-            </a:r>
-            <a:r>
-              <a:rPr lang="fr-FR" dirty="0" smtClean="0"/>
-              <a:t>et </a:t>
-            </a:r>
-            <a:r>
-              <a:rPr lang="fr-FR" dirty="0" err="1" smtClean="0"/>
-              <a:t>Scilab</a:t>
-            </a:r>
-            <a:r>
-              <a:rPr lang="fr-FR" dirty="0" smtClean="0"/>
-              <a:t> sont des logiciels de calcul numériques. Ils possèdent un langage de programmation (haut niveau) permettant (entre autre) de manipuler aisément des matrices et d’afficher des courbes de résultats.</a:t>
-            </a:r>
-          </a:p>
-          <a:p>
-            <a:r>
-              <a:rPr lang="fr-FR" dirty="0" smtClean="0"/>
-              <a:t>Simulink et </a:t>
-            </a:r>
-            <a:r>
-              <a:rPr lang="fr-FR" dirty="0" err="1" smtClean="0"/>
-              <a:t>Xcos</a:t>
-            </a:r>
-            <a:r>
-              <a:rPr lang="fr-FR" dirty="0" smtClean="0"/>
-              <a:t> sont des modules respectifs de </a:t>
-            </a:r>
-            <a:r>
-              <a:rPr lang="fr-FR" dirty="0" err="1" smtClean="0"/>
-              <a:t>Matlab</a:t>
-            </a:r>
-            <a:r>
-              <a:rPr lang="fr-FR" dirty="0" smtClean="0"/>
-              <a:t> et </a:t>
-            </a:r>
-            <a:r>
-              <a:rPr lang="fr-FR" dirty="0" err="1" smtClean="0"/>
-              <a:t>Scilab</a:t>
-            </a:r>
-            <a:r>
-              <a:rPr lang="fr-FR" dirty="0" smtClean="0"/>
-              <a:t> permettant de réaliser des modélisations graphiques de systèmes </a:t>
-            </a:r>
-            <a:r>
-              <a:rPr lang="fr-FR" dirty="0" err="1" smtClean="0"/>
-              <a:t>multiphysiques</a:t>
-            </a:r>
-            <a:endParaRPr lang="fr-FR" dirty="0" smtClean="0"/>
+              <a:rPr lang="fr-FR" dirty="0" smtClean="0"/>
+              <a:t>Ne maitrisant pas les lois comportementales de tous les champs de la physique, comment modéliser de façon juste un système ?</a:t>
+            </a:r>
+          </a:p>
+          <a:p>
+            <a:pPr lvl="1"/>
+            <a:endParaRPr lang="fr-FR" dirty="0"/>
+          </a:p>
+          <a:p>
+            <a:r>
+              <a:rPr lang="fr-FR" dirty="0" smtClean="0"/>
+              <a:t>Problèmes de l’élève</a:t>
+            </a:r>
+          </a:p>
+          <a:p>
+            <a:pPr lvl="1"/>
+            <a:r>
+              <a:rPr lang="fr-FR" dirty="0" smtClean="0"/>
+              <a:t>Qu’est-ce que l’élève doit savoir ?</a:t>
+            </a:r>
+          </a:p>
+          <a:p>
+            <a:pPr lvl="1"/>
+            <a:r>
+              <a:rPr lang="fr-FR" dirty="0" smtClean="0"/>
+              <a:t>Qu’est-ce que l’élève doit savoir-faire ?</a:t>
+            </a:r>
+            <a:endParaRPr lang="fr-FR" dirty="0"/>
           </a:p>
         </p:txBody>
       </p:sp>
@@ -5775,6 +5756,534 @@
             <a:fld id="{136A7F36-7A21-4EA8-9DC2-F00219448035}" type="slidenum">
               <a:rPr lang="fr-FR" smtClean="0"/>
               <a:t>11</a:t>
+            </a:fld>
+            <a:endParaRPr lang="fr-FR"/>
+          </a:p>
+        </p:txBody>
+      </p:sp>
+    </p:spTree>
+    <p:extLst>
+      <p:ext uri="{BB962C8B-B14F-4D97-AF65-F5344CB8AC3E}">
+        <p14:creationId xmlns:p14="http://schemas.microsoft.com/office/powerpoint/2010/main" val="4081467805"/>
+      </p:ext>
+    </p:extLst>
+  </p:cSld>
+  <p:clrMapOvr>
+    <a:masterClrMapping/>
+  </p:clrMapOvr>
+</p:sld>
+</file>
+
+<file path=ppt/slides/slide12.xml><?xml version="1.0" encoding="utf-8"?>
+<p:sld xmlns:a="http://schemas.openxmlformats.org/drawingml/2006/main" xmlns:r="http://schemas.openxmlformats.org/officeDocument/2006/relationships" xmlns:p="http://schemas.openxmlformats.org/presentationml/2006/main">
+  <p:cSld>
+    <p:spTree>
+      <p:nvGrpSpPr>
+        <p:cNvPr id="1" name=""/>
+        <p:cNvGrpSpPr/>
+        <p:nvPr/>
+      </p:nvGrpSpPr>
+      <p:grpSpPr>
+        <a:xfrm>
+          <a:off x="0" y="0"/>
+          <a:ext cx="0" cy="0"/>
+          <a:chOff x="0" y="0"/>
+          <a:chExt cx="0" cy="0"/>
+        </a:xfrm>
+      </p:grpSpPr>
+      <p:sp>
+        <p:nvSpPr>
+          <p:cNvPr id="2" name="Titre 1"/>
+          <p:cNvSpPr>
+            <a:spLocks noGrp="1"/>
+          </p:cNvSpPr>
+          <p:nvPr>
+            <p:ph type="title"/>
+          </p:nvPr>
+        </p:nvSpPr>
+        <p:spPr/>
+        <p:txBody>
+          <a:bodyPr>
+            <a:noAutofit/>
+          </a:bodyPr>
+          <a:lstStyle/>
+          <a:p>
+            <a:r>
+              <a:rPr lang="fr-FR" sz="2400" dirty="0"/>
+              <a:t>Modélisation multiphysique</a:t>
+            </a:r>
+            <a:br>
+              <a:rPr lang="fr-FR" sz="2400" dirty="0"/>
+            </a:br>
+            <a:r>
+              <a:rPr lang="fr-FR" sz="2400" dirty="0" smtClean="0"/>
+              <a:t>Modélisation Causale/ Modélisation Acausale</a:t>
+            </a:r>
+            <a:endParaRPr lang="fr-FR" sz="2400" dirty="0"/>
+          </a:p>
+        </p:txBody>
+      </p:sp>
+      <p:sp>
+        <p:nvSpPr>
+          <p:cNvPr id="3" name="Espace réservé du contenu 2"/>
+          <p:cNvSpPr>
+            <a:spLocks noGrp="1"/>
+          </p:cNvSpPr>
+          <p:nvPr>
+            <p:ph sz="quarter" idx="1"/>
+          </p:nvPr>
+        </p:nvSpPr>
+        <p:spPr/>
+        <p:txBody>
+          <a:bodyPr/>
+          <a:lstStyle/>
+          <a:p>
+            <a:r>
+              <a:rPr lang="fr-FR" dirty="0" smtClean="0"/>
+              <a:t>Dans le cadre de nos activités, on distingue la modélisation causale et acausale.</a:t>
+            </a:r>
+          </a:p>
+          <a:p>
+            <a:endParaRPr lang="fr-FR" dirty="0"/>
+          </a:p>
+          <a:p>
+            <a:r>
+              <a:rPr lang="fr-FR" dirty="0" smtClean="0"/>
+              <a:t>Les modèles causaux reposent sur une modélisation des systèmes par transformée de Laplace. Les simulations peuvent se faire par la « manipulation » de fonctions rationnelles.</a:t>
+            </a:r>
+          </a:p>
+          <a:p>
+            <a:endParaRPr lang="fr-FR" dirty="0"/>
+          </a:p>
+          <a:p>
+            <a:r>
+              <a:rPr lang="fr-FR" dirty="0" smtClean="0"/>
+              <a:t>Les modèles acausaux reposent sur une modélisation des systèmes par des équations différentielles (sans transformation dans le domaine de Laplace). Les simulations sont réalisée par une résolution numérique des équations différentielles.</a:t>
+            </a:r>
+            <a:endParaRPr lang="fr-FR" dirty="0"/>
+          </a:p>
+        </p:txBody>
+      </p:sp>
+      <p:sp>
+        <p:nvSpPr>
+          <p:cNvPr id="4" name="Espace réservé du numéro de diapositive 3"/>
+          <p:cNvSpPr>
+            <a:spLocks noGrp="1"/>
+          </p:cNvSpPr>
+          <p:nvPr>
+            <p:ph type="sldNum" sz="quarter" idx="15"/>
+          </p:nvPr>
+        </p:nvSpPr>
+        <p:spPr/>
+        <p:txBody>
+          <a:bodyPr/>
+          <a:lstStyle/>
+          <a:p>
+            <a:fld id="{136A7F36-7A21-4EA8-9DC2-F00219448035}" type="slidenum">
+              <a:rPr lang="fr-FR" smtClean="0"/>
+              <a:t>12</a:t>
+            </a:fld>
+            <a:endParaRPr lang="fr-FR"/>
+          </a:p>
+        </p:txBody>
+      </p:sp>
+    </p:spTree>
+    <p:extLst>
+      <p:ext uri="{BB962C8B-B14F-4D97-AF65-F5344CB8AC3E}">
+        <p14:creationId xmlns:p14="http://schemas.microsoft.com/office/powerpoint/2010/main" val="3594615262"/>
+      </p:ext>
+    </p:extLst>
+  </p:cSld>
+  <p:clrMapOvr>
+    <a:masterClrMapping/>
+  </p:clrMapOvr>
+</p:sld>
+</file>
+
+<file path=ppt/slides/slide13.xml><?xml version="1.0" encoding="utf-8"?>
+<p:sld xmlns:a="http://schemas.openxmlformats.org/drawingml/2006/main" xmlns:r="http://schemas.openxmlformats.org/officeDocument/2006/relationships" xmlns:p="http://schemas.openxmlformats.org/presentationml/2006/main">
+  <p:cSld>
+    <p:spTree>
+      <p:nvGrpSpPr>
+        <p:cNvPr id="1" name=""/>
+        <p:cNvGrpSpPr/>
+        <p:nvPr/>
+      </p:nvGrpSpPr>
+      <p:grpSpPr>
+        <a:xfrm>
+          <a:off x="0" y="0"/>
+          <a:ext cx="0" cy="0"/>
+          <a:chOff x="0" y="0"/>
+          <a:chExt cx="0" cy="0"/>
+        </a:xfrm>
+      </p:grpSpPr>
+      <p:sp>
+        <p:nvSpPr>
+          <p:cNvPr id="2" name="Titre 1"/>
+          <p:cNvSpPr>
+            <a:spLocks noGrp="1"/>
+          </p:cNvSpPr>
+          <p:nvPr>
+            <p:ph type="title"/>
+          </p:nvPr>
+        </p:nvSpPr>
+        <p:spPr/>
+        <p:txBody>
+          <a:bodyPr>
+            <a:noAutofit/>
+          </a:bodyPr>
+          <a:lstStyle/>
+          <a:p>
+            <a:r>
+              <a:rPr lang="fr-FR" sz="2400" dirty="0"/>
+              <a:t>Modélisation multiphysique</a:t>
+            </a:r>
+            <a:br>
+              <a:rPr lang="fr-FR" sz="2400" dirty="0"/>
+            </a:br>
+            <a:r>
+              <a:rPr lang="fr-FR" sz="2400" dirty="0"/>
+              <a:t>Modélisation Causale/ Modélisation Acausale</a:t>
+            </a:r>
+          </a:p>
+        </p:txBody>
+      </p:sp>
+      <p:sp>
+        <p:nvSpPr>
+          <p:cNvPr id="3" name="Espace réservé du contenu 2"/>
+          <p:cNvSpPr>
+            <a:spLocks noGrp="1"/>
+          </p:cNvSpPr>
+          <p:nvPr>
+            <p:ph sz="quarter" idx="1"/>
+          </p:nvPr>
+        </p:nvSpPr>
+        <p:spPr/>
+        <p:txBody>
+          <a:bodyPr/>
+          <a:lstStyle/>
+          <a:p>
+            <a:r>
+              <a:rPr lang="fr-FR" dirty="0" smtClean="0"/>
+              <a:t>Représentation graphique de modèles causaux et acausaux</a:t>
+            </a:r>
+            <a:endParaRPr lang="fr-FR" dirty="0"/>
+          </a:p>
+        </p:txBody>
+      </p:sp>
+      <p:sp>
+        <p:nvSpPr>
+          <p:cNvPr id="4" name="Espace réservé du numéro de diapositive 3"/>
+          <p:cNvSpPr>
+            <a:spLocks noGrp="1"/>
+          </p:cNvSpPr>
+          <p:nvPr>
+            <p:ph type="sldNum" sz="quarter" idx="15"/>
+          </p:nvPr>
+        </p:nvSpPr>
+        <p:spPr/>
+        <p:txBody>
+          <a:bodyPr/>
+          <a:lstStyle/>
+          <a:p>
+            <a:fld id="{136A7F36-7A21-4EA8-9DC2-F00219448035}" type="slidenum">
+              <a:rPr lang="fr-FR" smtClean="0"/>
+              <a:t>13</a:t>
+            </a:fld>
+            <a:endParaRPr lang="fr-FR"/>
+          </a:p>
+        </p:txBody>
+      </p:sp>
+    </p:spTree>
+    <p:extLst>
+      <p:ext uri="{BB962C8B-B14F-4D97-AF65-F5344CB8AC3E}">
+        <p14:creationId xmlns:p14="http://schemas.microsoft.com/office/powerpoint/2010/main" val="386149566"/>
+      </p:ext>
+    </p:extLst>
+  </p:cSld>
+  <p:clrMapOvr>
+    <a:masterClrMapping/>
+  </p:clrMapOvr>
+</p:sld>
+</file>
+
+<file path=ppt/slides/slide14.xml><?xml version="1.0" encoding="utf-8"?>
+<p:sld xmlns:a="http://schemas.openxmlformats.org/drawingml/2006/main" xmlns:r="http://schemas.openxmlformats.org/officeDocument/2006/relationships" xmlns:p="http://schemas.openxmlformats.org/presentationml/2006/main">
+  <p:cSld>
+    <p:spTree>
+      <p:nvGrpSpPr>
+        <p:cNvPr id="1" name=""/>
+        <p:cNvGrpSpPr/>
+        <p:nvPr/>
+      </p:nvGrpSpPr>
+      <p:grpSpPr>
+        <a:xfrm>
+          <a:off x="0" y="0"/>
+          <a:ext cx="0" cy="0"/>
+          <a:chOff x="0" y="0"/>
+          <a:chExt cx="0" cy="0"/>
+        </a:xfrm>
+      </p:grpSpPr>
+      <p:sp>
+        <p:nvSpPr>
+          <p:cNvPr id="4" name="Titre 3"/>
+          <p:cNvSpPr>
+            <a:spLocks noGrp="1"/>
+          </p:cNvSpPr>
+          <p:nvPr>
+            <p:ph type="title"/>
+          </p:nvPr>
+        </p:nvSpPr>
+        <p:spPr/>
+        <p:txBody>
+          <a:bodyPr/>
+          <a:lstStyle/>
+          <a:p>
+            <a:r>
+              <a:rPr lang="fr-FR" dirty="0" err="1" smtClean="0"/>
+              <a:t>Scilab</a:t>
+            </a:r>
+            <a:r>
+              <a:rPr lang="fr-FR" dirty="0" smtClean="0"/>
+              <a:t>, </a:t>
+            </a:r>
+            <a:r>
+              <a:rPr lang="fr-FR" dirty="0" err="1" smtClean="0"/>
+              <a:t>Matlab</a:t>
+            </a:r>
+            <a:r>
+              <a:rPr lang="fr-FR" dirty="0" smtClean="0"/>
+              <a:t>, Simulink, </a:t>
+            </a:r>
+            <a:r>
+              <a:rPr lang="fr-FR" dirty="0" err="1" smtClean="0"/>
+              <a:t>Xcos</a:t>
+            </a:r>
+            <a:r>
+              <a:rPr lang="fr-FR" dirty="0" smtClean="0"/>
+              <a:t>, </a:t>
+            </a:r>
+            <a:r>
+              <a:rPr lang="fr-FR" dirty="0" err="1" smtClean="0"/>
+              <a:t>Modelica</a:t>
+            </a:r>
+            <a:endParaRPr lang="fr-FR" dirty="0"/>
+          </a:p>
+        </p:txBody>
+      </p:sp>
+      <p:sp>
+        <p:nvSpPr>
+          <p:cNvPr id="5" name="Espace réservé du texte 4"/>
+          <p:cNvSpPr>
+            <a:spLocks noGrp="1"/>
+          </p:cNvSpPr>
+          <p:nvPr>
+            <p:ph type="body" idx="1"/>
+          </p:nvPr>
+        </p:nvSpPr>
+        <p:spPr/>
+        <p:txBody>
+          <a:bodyPr/>
+          <a:lstStyle/>
+          <a:p>
+            <a:r>
+              <a:rPr lang="fr-FR" dirty="0" smtClean="0"/>
+              <a:t>Qu’est ce que c’est tout ça ?</a:t>
+            </a:r>
+            <a:endParaRPr lang="fr-FR" dirty="0"/>
+          </a:p>
+        </p:txBody>
+      </p:sp>
+      <p:sp>
+        <p:nvSpPr>
+          <p:cNvPr id="6" name="Espace réservé du numéro de diapositive 5"/>
+          <p:cNvSpPr>
+            <a:spLocks noGrp="1"/>
+          </p:cNvSpPr>
+          <p:nvPr>
+            <p:ph type="sldNum" sz="quarter" idx="12"/>
+          </p:nvPr>
+        </p:nvSpPr>
+        <p:spPr/>
+        <p:txBody>
+          <a:bodyPr/>
+          <a:lstStyle/>
+          <a:p>
+            <a:fld id="{136A7F36-7A21-4EA8-9DC2-F00219448035}" type="slidenum">
+              <a:rPr lang="fr-FR" smtClean="0"/>
+              <a:t>14</a:t>
+            </a:fld>
+            <a:endParaRPr lang="fr-FR"/>
+          </a:p>
+        </p:txBody>
+      </p:sp>
+    </p:spTree>
+    <p:extLst>
+      <p:ext uri="{BB962C8B-B14F-4D97-AF65-F5344CB8AC3E}">
+        <p14:creationId xmlns:p14="http://schemas.microsoft.com/office/powerpoint/2010/main" val="3489141374"/>
+      </p:ext>
+    </p:extLst>
+  </p:cSld>
+  <p:clrMapOvr>
+    <a:masterClrMapping/>
+  </p:clrMapOvr>
+</p:sld>
+</file>
+
+<file path=ppt/slides/slide15.xml><?xml version="1.0" encoding="utf-8"?>
+<p:sld xmlns:a="http://schemas.openxmlformats.org/drawingml/2006/main" xmlns:r="http://schemas.openxmlformats.org/officeDocument/2006/relationships" xmlns:p="http://schemas.openxmlformats.org/presentationml/2006/main">
+  <p:cSld>
+    <p:spTree>
+      <p:nvGrpSpPr>
+        <p:cNvPr id="1" name=""/>
+        <p:cNvGrpSpPr/>
+        <p:nvPr/>
+      </p:nvGrpSpPr>
+      <p:grpSpPr>
+        <a:xfrm>
+          <a:off x="0" y="0"/>
+          <a:ext cx="0" cy="0"/>
+          <a:chOff x="0" y="0"/>
+          <a:chExt cx="0" cy="0"/>
+        </a:xfrm>
+      </p:grpSpPr>
+      <p:sp>
+        <p:nvSpPr>
+          <p:cNvPr id="5" name="Titre 4"/>
+          <p:cNvSpPr>
+            <a:spLocks noGrp="1"/>
+          </p:cNvSpPr>
+          <p:nvPr>
+            <p:ph type="title"/>
+          </p:nvPr>
+        </p:nvSpPr>
+        <p:spPr/>
+        <p:txBody>
+          <a:bodyPr/>
+          <a:lstStyle/>
+          <a:p>
+            <a:r>
+              <a:rPr lang="fr-FR" dirty="0" smtClean="0"/>
+              <a:t>Les logiciels de calcul numérique</a:t>
+            </a:r>
+            <a:endParaRPr lang="fr-FR" dirty="0"/>
+          </a:p>
+        </p:txBody>
+      </p:sp>
+      <p:sp>
+        <p:nvSpPr>
+          <p:cNvPr id="6" name="Espace réservé du contenu 5"/>
+          <p:cNvSpPr>
+            <a:spLocks noGrp="1"/>
+          </p:cNvSpPr>
+          <p:nvPr>
+            <p:ph sz="quarter" idx="1"/>
+          </p:nvPr>
+        </p:nvSpPr>
+        <p:spPr/>
+        <p:txBody>
+          <a:bodyPr/>
+          <a:lstStyle/>
+          <a:p>
+            <a:r>
+              <a:rPr lang="fr-FR" dirty="0" smtClean="0"/>
+              <a:t>Parmi les logiciels de simulation numérique utilisés dans la recherche ou dans l’industrie on trouve </a:t>
+            </a:r>
+            <a:r>
+              <a:rPr lang="fr-FR" dirty="0" err="1" smtClean="0"/>
+              <a:t>Matlab</a:t>
+            </a:r>
+            <a:r>
+              <a:rPr lang="fr-FR" dirty="0" smtClean="0"/>
+              <a:t> et </a:t>
+            </a:r>
+            <a:r>
+              <a:rPr lang="fr-FR" dirty="0" err="1" smtClean="0"/>
+              <a:t>Scilab</a:t>
+            </a:r>
+            <a:r>
+              <a:rPr lang="fr-FR" dirty="0" smtClean="0"/>
+              <a:t>.</a:t>
+            </a:r>
+          </a:p>
+          <a:p>
+            <a:pPr lvl="1"/>
+            <a:r>
+              <a:rPr lang="fr-FR" dirty="0" err="1" smtClean="0"/>
+              <a:t>Matlab</a:t>
+            </a:r>
+            <a:r>
+              <a:rPr lang="fr-FR" dirty="0"/>
+              <a:t> </a:t>
+            </a:r>
+            <a:r>
+              <a:rPr lang="fr-FR" dirty="0" smtClean="0"/>
+              <a:t>et </a:t>
+            </a:r>
+            <a:r>
+              <a:rPr lang="fr-FR" dirty="0" err="1" smtClean="0"/>
+              <a:t>Scilab</a:t>
+            </a:r>
+            <a:r>
+              <a:rPr lang="fr-FR" dirty="0" smtClean="0"/>
+              <a:t> sont des logiciels de calcul numériques. Ils possèdent un langage de programmation (haut niveau) permettant (entre autre) de manipuler aisément des matrices et d’afficher des courbes de résultats.</a:t>
+            </a:r>
+          </a:p>
+          <a:p>
+            <a:r>
+              <a:rPr lang="fr-FR" dirty="0" smtClean="0"/>
+              <a:t>Simulink et </a:t>
+            </a:r>
+            <a:r>
+              <a:rPr lang="fr-FR" dirty="0" err="1" smtClean="0"/>
+              <a:t>Xcos</a:t>
+            </a:r>
+            <a:r>
+              <a:rPr lang="fr-FR" dirty="0" smtClean="0"/>
+              <a:t> sont des modules respectifs de </a:t>
+            </a:r>
+            <a:r>
+              <a:rPr lang="fr-FR" dirty="0" err="1" smtClean="0"/>
+              <a:t>Matlab</a:t>
+            </a:r>
+            <a:r>
+              <a:rPr lang="fr-FR" dirty="0" smtClean="0"/>
+              <a:t> et </a:t>
+            </a:r>
+            <a:r>
+              <a:rPr lang="fr-FR" dirty="0" err="1" smtClean="0"/>
+              <a:t>Scilab</a:t>
+            </a:r>
+            <a:r>
+              <a:rPr lang="fr-FR" dirty="0" smtClean="0"/>
+              <a:t> permettant de réaliser des modélisations graphiques de systèmes </a:t>
+            </a:r>
+            <a:r>
+              <a:rPr lang="fr-FR" dirty="0" err="1" smtClean="0"/>
+              <a:t>multiphysiques</a:t>
+            </a:r>
+            <a:endParaRPr lang="fr-FR" dirty="0" smtClean="0"/>
+          </a:p>
+        </p:txBody>
+      </p:sp>
+      <p:sp>
+        <p:nvSpPr>
+          <p:cNvPr id="4" name="Espace réservé du numéro de diapositive 3"/>
+          <p:cNvSpPr>
+            <a:spLocks noGrp="1"/>
+          </p:cNvSpPr>
+          <p:nvPr>
+            <p:ph type="sldNum" sz="quarter" idx="15"/>
+          </p:nvPr>
+        </p:nvSpPr>
+        <p:spPr/>
+        <p:txBody>
+          <a:bodyPr/>
+          <a:lstStyle/>
+          <a:p>
+            <a:fld id="{136A7F36-7A21-4EA8-9DC2-F00219448035}" type="slidenum">
+              <a:rPr lang="fr-FR" smtClean="0"/>
+              <a:t>15</a:t>
             </a:fld>
             <a:endParaRPr lang="fr-FR"/>
           </a:p>
@@ -5863,7 +6372,7 @@
 </p:sld>
 </file>
 
-<file path=ppt/slides/slide12.xml><?xml version="1.0" encoding="utf-8"?>
+<file path=ppt/slides/slide16.xml><?xml version="1.0" encoding="utf-8"?>
 <p:sld xmlns:a="http://schemas.openxmlformats.org/drawingml/2006/main" xmlns:r="http://schemas.openxmlformats.org/officeDocument/2006/relationships" xmlns:p="http://schemas.openxmlformats.org/presentationml/2006/main">
   <p:cSld>
     <p:spTree>
@@ -6079,7 +6588,7 @@
           <a:p>
             <a:fld id="{136A7F36-7A21-4EA8-9DC2-F00219448035}" type="slidenum">
               <a:rPr lang="fr-FR" smtClean="0"/>
-              <a:t>12</a:t>
+              <a:t>16</a:t>
             </a:fld>
             <a:endParaRPr lang="fr-FR"/>
           </a:p>
@@ -6098,7 +6607,7 @@
 </p:sld>
 </file>
 
-<file path=ppt/slides/slide13.xml><?xml version="1.0" encoding="utf-8"?>
+<file path=ppt/slides/slide17.xml><?xml version="1.0" encoding="utf-8"?>
 <p:sld xmlns:a="http://schemas.openxmlformats.org/drawingml/2006/main" xmlns:r="http://schemas.openxmlformats.org/officeDocument/2006/relationships" xmlns:p="http://schemas.openxmlformats.org/presentationml/2006/main">
   <p:cSld>
     <p:spTree>
@@ -6178,7 +6687,7 @@
           <a:p>
             <a:fld id="{136A7F36-7A21-4EA8-9DC2-F00219448035}" type="slidenum">
               <a:rPr lang="fr-FR" smtClean="0"/>
-              <a:t>13</a:t>
+              <a:t>17</a:t>
             </a:fld>
             <a:endParaRPr lang="fr-FR"/>
           </a:p>
@@ -6197,7 +6706,7 @@
 </p:sld>
 </file>
 
-<file path=ppt/slides/slide14.xml><?xml version="1.0" encoding="utf-8"?>
+<file path=ppt/slides/slide18.xml><?xml version="1.0" encoding="utf-8"?>
 <p:sld xmlns:a="http://schemas.openxmlformats.org/drawingml/2006/main" xmlns:r="http://schemas.openxmlformats.org/officeDocument/2006/relationships" xmlns:p="http://schemas.openxmlformats.org/presentationml/2006/main">
   <p:cSld>
     <p:spTree>
@@ -6312,7 +6821,7 @@
           <a:p>
             <a:fld id="{136A7F36-7A21-4EA8-9DC2-F00219448035}" type="slidenum">
               <a:rPr lang="fr-FR" smtClean="0"/>
-              <a:t>14</a:t>
+              <a:t>18</a:t>
             </a:fld>
             <a:endParaRPr lang="fr-FR"/>
           </a:p>
@@ -6331,7 +6840,7 @@
 </p:sld>
 </file>
 
-<file path=ppt/slides/slide15.xml><?xml version="1.0" encoding="utf-8"?>
+<file path=ppt/slides/slide19.xml><?xml version="1.0" encoding="utf-8"?>
 <p:sld xmlns:a="http://schemas.openxmlformats.org/drawingml/2006/main" xmlns:r="http://schemas.openxmlformats.org/officeDocument/2006/relationships" xmlns:p="http://schemas.openxmlformats.org/presentationml/2006/main">
   <p:cSld>
     <p:spTree>
@@ -6407,7 +6916,7 @@
           <a:p>
             <a:fld id="{136A7F36-7A21-4EA8-9DC2-F00219448035}" type="slidenum">
               <a:rPr lang="fr-FR" smtClean="0"/>
-              <a:t>15</a:t>
+              <a:t>19</a:t>
             </a:fld>
             <a:endParaRPr lang="fr-FR"/>
           </a:p>
@@ -6426,7 +6935,7 @@
 </p:sld>
 </file>
 
-<file path=ppt/slides/slide16.xml><?xml version="1.0" encoding="utf-8"?>
+<file path=ppt/slides/slide2.xml><?xml version="1.0" encoding="utf-8"?>
 <p:sld xmlns:a="http://schemas.openxmlformats.org/drawingml/2006/main" xmlns:r="http://schemas.openxmlformats.org/officeDocument/2006/relationships" xmlns:p="http://schemas.openxmlformats.org/presentationml/2006/main">
   <p:cSld>
     <p:spTree>
@@ -6445,6 +6954,243 @@
       </p:grpSpPr>
       <p:sp>
         <p:nvSpPr>
+          <p:cNvPr id="2" name="Titre 1"/>
+          <p:cNvSpPr>
+            <a:spLocks noGrp="1"/>
+          </p:cNvSpPr>
+          <p:nvPr>
+            <p:ph type="title"/>
+          </p:nvPr>
+        </p:nvSpPr>
+        <p:spPr/>
+        <p:txBody>
+          <a:bodyPr/>
+          <a:lstStyle/>
+          <a:p>
+            <a:r>
+              <a:rPr lang="fr-FR" smtClean="0"/>
+              <a:t>Plan</a:t>
+            </a:r>
+            <a:endParaRPr lang="fr-FR" dirty="0"/>
+          </a:p>
+        </p:txBody>
+      </p:sp>
+      <p:sp>
+        <p:nvSpPr>
+          <p:cNvPr id="3" name="Espace réservé du contenu 2"/>
+          <p:cNvSpPr>
+            <a:spLocks noGrp="1"/>
+          </p:cNvSpPr>
+          <p:nvPr>
+            <p:ph sz="quarter" idx="1"/>
+          </p:nvPr>
+        </p:nvSpPr>
+        <p:spPr>
+          <a:xfrm>
+            <a:off x="251520" y="1268760"/>
+            <a:ext cx="7920880" cy="5472608"/>
+          </a:xfrm>
+        </p:spPr>
+        <p:txBody>
+          <a:bodyPr>
+            <a:normAutofit fontScale="77500" lnSpcReduction="20000"/>
+          </a:bodyPr>
+          <a:lstStyle/>
+          <a:p>
+            <a:r>
+              <a:rPr lang="fr-FR" dirty="0" smtClean="0"/>
+              <a:t>Modélisation </a:t>
+            </a:r>
+            <a:r>
+              <a:rPr lang="fr-FR" dirty="0" smtClean="0"/>
+              <a:t>multiphysique</a:t>
+            </a:r>
+            <a:endParaRPr lang="fr-FR" dirty="0" smtClean="0"/>
+          </a:p>
+          <a:p>
+            <a:pPr lvl="1"/>
+            <a:r>
+              <a:rPr lang="fr-FR" dirty="0" smtClean="0"/>
+              <a:t>Contexte dans l’enseignement</a:t>
+            </a:r>
+          </a:p>
+          <a:p>
+            <a:pPr lvl="1"/>
+            <a:r>
+              <a:rPr lang="fr-FR" dirty="0" smtClean="0"/>
+              <a:t>Définitions</a:t>
+            </a:r>
+          </a:p>
+          <a:p>
+            <a:pPr lvl="1"/>
+            <a:r>
+              <a:rPr lang="fr-FR" dirty="0" smtClean="0"/>
+              <a:t>Modèle de connaissance</a:t>
+            </a:r>
+          </a:p>
+          <a:p>
+            <a:pPr lvl="2"/>
+            <a:r>
+              <a:rPr lang="fr-FR" dirty="0" smtClean="0"/>
+              <a:t>Moteur à courant continu (linéaire/non linéaire ?)</a:t>
+            </a:r>
+          </a:p>
+          <a:p>
+            <a:pPr lvl="1"/>
+            <a:r>
+              <a:rPr lang="fr-FR" dirty="0" smtClean="0"/>
+              <a:t>Modélisation causale</a:t>
+            </a:r>
+          </a:p>
+          <a:p>
+            <a:pPr lvl="2"/>
+            <a:r>
+              <a:rPr lang="fr-FR" dirty="0" smtClean="0"/>
+              <a:t>Domaine symbolique (+FT) -&gt; Relation algébriques simples et loi E/S Simples</a:t>
+            </a:r>
+            <a:endParaRPr lang="fr-FR" dirty="0"/>
+          </a:p>
+          <a:p>
+            <a:pPr lvl="2"/>
+            <a:r>
+              <a:rPr lang="fr-FR" dirty="0" smtClean="0"/>
+              <a:t>CI nulles et modèles linéaires imposés (sauf hystérésis, saturation et seuils …)(sinon linéarisation+ pt de fonctionnement, pas de produit de fonctions  dans les équations du modèle).</a:t>
+            </a:r>
+          </a:p>
+          <a:p>
+            <a:pPr lvl="2"/>
+            <a:r>
+              <a:rPr lang="fr-FR" dirty="0" smtClean="0"/>
+              <a:t>Notion de sens S = F.E (Pas réversible)</a:t>
+            </a:r>
+          </a:p>
+          <a:p>
+            <a:pPr lvl="2"/>
+            <a:r>
+              <a:rPr lang="fr-FR" dirty="0" smtClean="0"/>
+              <a:t>Résolution numérique imposée par le modèle utilisé</a:t>
+            </a:r>
+          </a:p>
+          <a:p>
+            <a:pPr lvl="2"/>
+            <a:r>
+              <a:rPr lang="fr-FR" dirty="0" smtClean="0"/>
+              <a:t>La technologie des constituants n’apparaît pas</a:t>
+            </a:r>
+          </a:p>
+          <a:p>
+            <a:pPr lvl="2"/>
+            <a:r>
+              <a:rPr lang="fr-FR" dirty="0" smtClean="0"/>
+              <a:t>Notion d’irréversibilité du modèle</a:t>
+            </a:r>
+          </a:p>
+          <a:p>
+            <a:pPr lvl="2"/>
+            <a:r>
+              <a:rPr lang="fr-FR" dirty="0" smtClean="0"/>
+              <a:t>Cependant le calcul symbolique permet de faciliter les études harmoniques</a:t>
+            </a:r>
+          </a:p>
+          <a:p>
+            <a:pPr lvl="1"/>
+            <a:r>
+              <a:rPr lang="fr-FR" dirty="0" smtClean="0"/>
+              <a:t>Modélisation acausale</a:t>
+            </a:r>
+          </a:p>
+          <a:p>
+            <a:pPr lvl="2"/>
+            <a:r>
+              <a:rPr lang="fr-FR" dirty="0" smtClean="0"/>
+              <a:t>Symbolisation des constituants dédiés à la technologie utilisée (respect des normes, respect des connecteurs E/S, grandeurs physiques + polarité…)</a:t>
+            </a:r>
+          </a:p>
+          <a:p>
+            <a:pPr lvl="2"/>
+            <a:r>
+              <a:rPr lang="fr-FR" dirty="0" smtClean="0"/>
+              <a:t>Le modèle de connaissance n’est pas exigible, mais il faut maîtriser les paramètres caractérisant le comportement du constituant</a:t>
+            </a:r>
+          </a:p>
+          <a:p>
+            <a:pPr lvl="2"/>
+            <a:r>
+              <a:rPr lang="fr-FR" dirty="0" smtClean="0"/>
+              <a:t>Liens non orientés entre les blocs (Comparaison des modélisation causale et acausale sur une résistance)  Différence « Affectation / Équation ». Liens avec le diagramme paramétrique.</a:t>
+            </a:r>
+          </a:p>
+          <a:p>
+            <a:pPr lvl="2"/>
+            <a:r>
+              <a:rPr lang="fr-FR" dirty="0" smtClean="0"/>
+              <a:t>Ouvertures sur la réversibilité (réversibilité des composants, réversibilité des systèmes)</a:t>
+            </a:r>
+          </a:p>
+          <a:p>
+            <a:pPr lvl="2"/>
+            <a:r>
+              <a:rPr lang="fr-FR" dirty="0" smtClean="0"/>
+              <a:t>Le modèle n’impose pas de démarche de résolution. Le solveur se charge d’optimiser les calculs.  </a:t>
+            </a:r>
+          </a:p>
+        </p:txBody>
+      </p:sp>
+      <p:sp>
+        <p:nvSpPr>
+          <p:cNvPr id="4" name="Espace réservé du numéro de diapositive 3"/>
+          <p:cNvSpPr>
+            <a:spLocks noGrp="1"/>
+          </p:cNvSpPr>
+          <p:nvPr>
+            <p:ph type="sldNum" sz="quarter" idx="15"/>
+          </p:nvPr>
+        </p:nvSpPr>
+        <p:spPr/>
+        <p:txBody>
+          <a:bodyPr/>
+          <a:lstStyle/>
+          <a:p>
+            <a:fld id="{136A7F36-7A21-4EA8-9DC2-F00219448035}" type="slidenum">
+              <a:rPr lang="fr-FR" smtClean="0"/>
+              <a:t>2</a:t>
+            </a:fld>
+            <a:endParaRPr lang="fr-FR"/>
+          </a:p>
+        </p:txBody>
+      </p:sp>
+    </p:spTree>
+    <p:extLst>
+      <p:ext uri="{BB962C8B-B14F-4D97-AF65-F5344CB8AC3E}">
+        <p14:creationId xmlns:p14="http://schemas.microsoft.com/office/powerpoint/2010/main" val="3520046662"/>
+      </p:ext>
+    </p:extLst>
+  </p:cSld>
+  <p:clrMapOvr>
+    <a:masterClrMapping/>
+  </p:clrMapOvr>
+</p:sld>
+</file>
+
+<file path=ppt/slides/slide20.xml><?xml version="1.0" encoding="utf-8"?>
+<p:sld xmlns:a="http://schemas.openxmlformats.org/drawingml/2006/main" xmlns:r="http://schemas.openxmlformats.org/officeDocument/2006/relationships" xmlns:p="http://schemas.openxmlformats.org/presentationml/2006/main">
+  <p:cSld>
+    <p:spTree>
+      <p:nvGrpSpPr>
+        <p:cNvPr id="1" name=""/>
+        <p:cNvGrpSpPr/>
+        <p:nvPr/>
+      </p:nvGrpSpPr>
+      <p:grpSpPr>
+        <a:xfrm>
+          <a:off x="0" y="0"/>
+          <a:ext cx="0" cy="0"/>
+          <a:chOff x="0" y="0"/>
+          <a:chExt cx="0" cy="0"/>
+        </a:xfrm>
+      </p:grpSpPr>
+      <p:sp>
+        <p:nvSpPr>
           <p:cNvPr id="7" name="Espace réservé du contenu 6"/>
           <p:cNvSpPr>
             <a:spLocks noGrp="1"/>
@@ -6706,7 +7452,7 @@
           <a:p>
             <a:fld id="{136A7F36-7A21-4EA8-9DC2-F00219448035}" type="slidenum">
               <a:rPr lang="fr-FR" smtClean="0"/>
-              <a:t>16</a:t>
+              <a:t>20</a:t>
             </a:fld>
             <a:endParaRPr lang="fr-FR"/>
           </a:p>
@@ -6785,7 +7531,7 @@
 </p:sld>
 </file>
 
-<file path=ppt/slides/slide17.xml><?xml version="1.0" encoding="utf-8"?>
+<file path=ppt/slides/slide21.xml><?xml version="1.0" encoding="utf-8"?>
 <p:sld xmlns:a="http://schemas.openxmlformats.org/drawingml/2006/main" xmlns:r="http://schemas.openxmlformats.org/officeDocument/2006/relationships" xmlns:p="http://schemas.openxmlformats.org/presentationml/2006/main">
   <p:cSld>
     <p:spTree>
@@ -6842,7 +7588,7 @@
           <a:p>
             <a:fld id="{136A7F36-7A21-4EA8-9DC2-F00219448035}" type="slidenum">
               <a:rPr lang="fr-FR" smtClean="0"/>
-              <a:t>17</a:t>
+              <a:t>21</a:t>
             </a:fld>
             <a:endParaRPr lang="fr-FR"/>
           </a:p>
@@ -7057,655 +7803,6 @@
 </p:sld>
 </file>
 
-<file path=ppt/slides/slide18.xml><?xml version="1.0" encoding="utf-8"?>
-<p:sld xmlns:a="http://schemas.openxmlformats.org/drawingml/2006/main" xmlns:r="http://schemas.openxmlformats.org/officeDocument/2006/relationships" xmlns:p="http://schemas.openxmlformats.org/presentationml/2006/main">
-  <p:cSld>
-    <p:spTree>
-      <p:nvGrpSpPr>
-        <p:cNvPr id="1" name=""/>
-        <p:cNvGrpSpPr/>
-        <p:nvPr/>
-      </p:nvGrpSpPr>
-      <p:grpSpPr>
-        <a:xfrm>
-          <a:off x="0" y="0"/>
-          <a:ext cx="0" cy="0"/>
-          <a:chOff x="0" y="0"/>
-          <a:chExt cx="0" cy="0"/>
-        </a:xfrm>
-      </p:grpSpPr>
-      <p:sp>
-        <p:nvSpPr>
-          <p:cNvPr id="2" name="Titre 1"/>
-          <p:cNvSpPr>
-            <a:spLocks noGrp="1"/>
-          </p:cNvSpPr>
-          <p:nvPr>
-            <p:ph type="title"/>
-          </p:nvPr>
-        </p:nvSpPr>
-        <p:spPr/>
-        <p:txBody>
-          <a:bodyPr>
-            <a:normAutofit fontScale="90000"/>
-          </a:bodyPr>
-          <a:lstStyle/>
-          <a:p>
-            <a:r>
-              <a:rPr lang="fr-FR" dirty="0" smtClean="0"/>
-              <a:t>Modélisation d’un système multiphysique</a:t>
-            </a:r>
-            <a:endParaRPr lang="fr-FR" dirty="0"/>
-          </a:p>
-        </p:txBody>
-      </p:sp>
-      <p:sp>
-        <p:nvSpPr>
-          <p:cNvPr id="3" name="Espace réservé du contenu 2"/>
-          <p:cNvSpPr>
-            <a:spLocks noGrp="1"/>
-          </p:cNvSpPr>
-          <p:nvPr>
-            <p:ph sz="quarter" idx="1"/>
-          </p:nvPr>
-        </p:nvSpPr>
-        <p:spPr/>
-        <p:txBody>
-          <a:bodyPr/>
-          <a:lstStyle/>
-          <a:p>
-            <a:endParaRPr lang="fr-FR"/>
-          </a:p>
-        </p:txBody>
-      </p:sp>
-      <p:sp>
-        <p:nvSpPr>
-          <p:cNvPr id="4" name="Espace réservé du numéro de diapositive 3"/>
-          <p:cNvSpPr>
-            <a:spLocks noGrp="1"/>
-          </p:cNvSpPr>
-          <p:nvPr>
-            <p:ph type="sldNum" sz="quarter" idx="15"/>
-          </p:nvPr>
-        </p:nvSpPr>
-        <p:spPr/>
-        <p:txBody>
-          <a:bodyPr/>
-          <a:lstStyle/>
-          <a:p>
-            <a:fld id="{136A7F36-7A21-4EA8-9DC2-F00219448035}" type="slidenum">
-              <a:rPr lang="fr-FR" smtClean="0"/>
-              <a:t>18</a:t>
-            </a:fld>
-            <a:endParaRPr lang="fr-FR"/>
-          </a:p>
-        </p:txBody>
-      </p:sp>
-    </p:spTree>
-    <p:extLst>
-      <p:ext uri="{BB962C8B-B14F-4D97-AF65-F5344CB8AC3E}">
-        <p14:creationId xmlns:p14="http://schemas.microsoft.com/office/powerpoint/2010/main" val="1827117536"/>
-      </p:ext>
-    </p:extLst>
-  </p:cSld>
-  <p:clrMapOvr>
-    <a:masterClrMapping/>
-  </p:clrMapOvr>
-</p:sld>
-</file>
-
-<file path=ppt/slides/slide19.xml><?xml version="1.0" encoding="utf-8"?>
-<p:sld xmlns:a="http://schemas.openxmlformats.org/drawingml/2006/main" xmlns:r="http://schemas.openxmlformats.org/officeDocument/2006/relationships" xmlns:p="http://schemas.openxmlformats.org/presentationml/2006/main">
-  <p:cSld>
-    <p:spTree>
-      <p:nvGrpSpPr>
-        <p:cNvPr id="1" name=""/>
-        <p:cNvGrpSpPr/>
-        <p:nvPr/>
-      </p:nvGrpSpPr>
-      <p:grpSpPr>
-        <a:xfrm>
-          <a:off x="0" y="0"/>
-          <a:ext cx="0" cy="0"/>
-          <a:chOff x="0" y="0"/>
-          <a:chExt cx="0" cy="0"/>
-        </a:xfrm>
-      </p:grpSpPr>
-      <p:sp>
-        <p:nvSpPr>
-          <p:cNvPr id="2" name="Titre 1"/>
-          <p:cNvSpPr>
-            <a:spLocks noGrp="1"/>
-          </p:cNvSpPr>
-          <p:nvPr>
-            <p:ph type="title"/>
-          </p:nvPr>
-        </p:nvSpPr>
-        <p:spPr/>
-        <p:txBody>
-          <a:bodyPr>
-            <a:normAutofit fontScale="90000"/>
-          </a:bodyPr>
-          <a:lstStyle/>
-          <a:p>
-            <a:r>
-              <a:rPr lang="fr-FR" dirty="0" smtClean="0"/>
-              <a:t>Modélisation d’un système multiphysique</a:t>
-            </a:r>
-            <a:endParaRPr lang="fr-FR" dirty="0"/>
-          </a:p>
-        </p:txBody>
-      </p:sp>
-      <p:sp>
-        <p:nvSpPr>
-          <p:cNvPr id="3" name="Espace réservé du contenu 2"/>
-          <p:cNvSpPr>
-            <a:spLocks noGrp="1"/>
-          </p:cNvSpPr>
-          <p:nvPr>
-            <p:ph sz="quarter" idx="1"/>
-          </p:nvPr>
-        </p:nvSpPr>
-        <p:spPr/>
-        <p:txBody>
-          <a:bodyPr/>
-          <a:lstStyle/>
-          <a:p>
-            <a:endParaRPr lang="fr-FR"/>
-          </a:p>
-        </p:txBody>
-      </p:sp>
-      <p:sp>
-        <p:nvSpPr>
-          <p:cNvPr id="4" name="Espace réservé du numéro de diapositive 3"/>
-          <p:cNvSpPr>
-            <a:spLocks noGrp="1"/>
-          </p:cNvSpPr>
-          <p:nvPr>
-            <p:ph type="sldNum" sz="quarter" idx="15"/>
-          </p:nvPr>
-        </p:nvSpPr>
-        <p:spPr/>
-        <p:txBody>
-          <a:bodyPr/>
-          <a:lstStyle/>
-          <a:p>
-            <a:fld id="{136A7F36-7A21-4EA8-9DC2-F00219448035}" type="slidenum">
-              <a:rPr lang="fr-FR" smtClean="0"/>
-              <a:t>19</a:t>
-            </a:fld>
-            <a:endParaRPr lang="fr-FR"/>
-          </a:p>
-        </p:txBody>
-      </p:sp>
-    </p:spTree>
-    <p:extLst>
-      <p:ext uri="{BB962C8B-B14F-4D97-AF65-F5344CB8AC3E}">
-        <p14:creationId xmlns:p14="http://schemas.microsoft.com/office/powerpoint/2010/main" val="241906218"/>
-      </p:ext>
-    </p:extLst>
-  </p:cSld>
-  <p:clrMapOvr>
-    <a:masterClrMapping/>
-  </p:clrMapOvr>
-</p:sld>
-</file>
-
-<file path=ppt/slides/slide2.xml><?xml version="1.0" encoding="utf-8"?>
-<p:sld xmlns:a="http://schemas.openxmlformats.org/drawingml/2006/main" xmlns:r="http://schemas.openxmlformats.org/officeDocument/2006/relationships" xmlns:p="http://schemas.openxmlformats.org/presentationml/2006/main">
-  <p:cSld>
-    <p:spTree>
-      <p:nvGrpSpPr>
-        <p:cNvPr id="1" name=""/>
-        <p:cNvGrpSpPr/>
-        <p:nvPr/>
-      </p:nvGrpSpPr>
-      <p:grpSpPr>
-        <a:xfrm>
-          <a:off x="0" y="0"/>
-          <a:ext cx="0" cy="0"/>
-          <a:chOff x="0" y="0"/>
-          <a:chExt cx="0" cy="0"/>
-        </a:xfrm>
-      </p:grpSpPr>
-      <p:sp>
-        <p:nvSpPr>
-          <p:cNvPr id="2" name="Titre 1"/>
-          <p:cNvSpPr>
-            <a:spLocks noGrp="1"/>
-          </p:cNvSpPr>
-          <p:nvPr>
-            <p:ph type="title"/>
-          </p:nvPr>
-        </p:nvSpPr>
-        <p:spPr/>
-        <p:txBody>
-          <a:bodyPr/>
-          <a:lstStyle/>
-          <a:p>
-            <a:r>
-              <a:rPr lang="fr-FR" smtClean="0"/>
-              <a:t>Plan</a:t>
-            </a:r>
-            <a:endParaRPr lang="fr-FR" dirty="0"/>
-          </a:p>
-        </p:txBody>
-      </p:sp>
-      <p:sp>
-        <p:nvSpPr>
-          <p:cNvPr id="3" name="Espace réservé du contenu 2"/>
-          <p:cNvSpPr>
-            <a:spLocks noGrp="1"/>
-          </p:cNvSpPr>
-          <p:nvPr>
-            <p:ph sz="quarter" idx="1"/>
-          </p:nvPr>
-        </p:nvSpPr>
-        <p:spPr>
-          <a:xfrm>
-            <a:off x="251520" y="1268760"/>
-            <a:ext cx="7920880" cy="5472608"/>
-          </a:xfrm>
-        </p:spPr>
-        <p:txBody>
-          <a:bodyPr>
-            <a:normAutofit fontScale="77500" lnSpcReduction="20000"/>
-          </a:bodyPr>
-          <a:lstStyle/>
-          <a:p>
-            <a:r>
-              <a:rPr lang="fr-FR" dirty="0" smtClean="0"/>
-              <a:t>Modélisation </a:t>
-            </a:r>
-            <a:r>
-              <a:rPr lang="fr-FR" dirty="0" smtClean="0"/>
-              <a:t>multiphysique (30 min)</a:t>
-            </a:r>
-            <a:endParaRPr lang="fr-FR" dirty="0" smtClean="0"/>
-          </a:p>
-          <a:p>
-            <a:pPr lvl="1"/>
-            <a:r>
-              <a:rPr lang="fr-FR" dirty="0" smtClean="0"/>
-              <a:t>Contexte dans l’enseignement</a:t>
-            </a:r>
-          </a:p>
-          <a:p>
-            <a:pPr lvl="1"/>
-            <a:r>
-              <a:rPr lang="fr-FR" dirty="0" smtClean="0"/>
-              <a:t>Définitions</a:t>
-            </a:r>
-          </a:p>
-          <a:p>
-            <a:pPr lvl="1"/>
-            <a:r>
-              <a:rPr lang="fr-FR" dirty="0" smtClean="0"/>
-              <a:t>Modèle de connaissance</a:t>
-            </a:r>
-          </a:p>
-          <a:p>
-            <a:pPr lvl="2"/>
-            <a:r>
-              <a:rPr lang="fr-FR" dirty="0" smtClean="0"/>
-              <a:t>Moteur à courant continu (linéaire/non linéaire ?)</a:t>
-            </a:r>
-            <a:endParaRPr lang="fr-FR" dirty="0" smtClean="0"/>
-          </a:p>
-          <a:p>
-            <a:pPr lvl="1"/>
-            <a:r>
-              <a:rPr lang="fr-FR" dirty="0" smtClean="0"/>
-              <a:t>Modélisation </a:t>
-            </a:r>
-            <a:r>
-              <a:rPr lang="fr-FR" dirty="0" smtClean="0"/>
-              <a:t>causale</a:t>
-            </a:r>
-          </a:p>
-          <a:p>
-            <a:pPr lvl="2"/>
-            <a:r>
-              <a:rPr lang="fr-FR" dirty="0" smtClean="0"/>
-              <a:t>Domaine symbolique (+FT) -&gt; Relation algébriques simples et loi E/S Simples</a:t>
-            </a:r>
-            <a:endParaRPr lang="fr-FR" dirty="0"/>
-          </a:p>
-          <a:p>
-            <a:pPr lvl="2"/>
-            <a:r>
-              <a:rPr lang="fr-FR" dirty="0" smtClean="0"/>
-              <a:t>CI nulles et modèles linéaires imposés (sauf hystérésis, saturation et seuils …)(sinon linéarisation+ pt de fonctionnement, pas de produit de fonctions  dans les équations du modèle).</a:t>
-            </a:r>
-          </a:p>
-          <a:p>
-            <a:pPr lvl="2"/>
-            <a:r>
-              <a:rPr lang="fr-FR" dirty="0" smtClean="0"/>
-              <a:t>Notion de sens S = F.E (Pas réversible)</a:t>
-            </a:r>
-          </a:p>
-          <a:p>
-            <a:pPr lvl="2"/>
-            <a:r>
-              <a:rPr lang="fr-FR" dirty="0" smtClean="0"/>
-              <a:t>Résolution numérique imposée par le modèle utilisé</a:t>
-            </a:r>
-          </a:p>
-          <a:p>
-            <a:pPr lvl="2"/>
-            <a:r>
-              <a:rPr lang="fr-FR" dirty="0" smtClean="0"/>
-              <a:t>La technologie des constituants n’apparaît pas</a:t>
-            </a:r>
-          </a:p>
-          <a:p>
-            <a:pPr lvl="2"/>
-            <a:r>
-              <a:rPr lang="fr-FR" dirty="0" smtClean="0"/>
-              <a:t>Notion d’irréversibilité du modèle</a:t>
-            </a:r>
-          </a:p>
-          <a:p>
-            <a:pPr lvl="2"/>
-            <a:r>
-              <a:rPr lang="fr-FR" dirty="0" smtClean="0"/>
-              <a:t>Cependant le calcul symbolique permet de faciliter les études harmoniques</a:t>
-            </a:r>
-            <a:endParaRPr lang="fr-FR" dirty="0" smtClean="0"/>
-          </a:p>
-          <a:p>
-            <a:pPr lvl="1"/>
-            <a:r>
-              <a:rPr lang="fr-FR" dirty="0" smtClean="0"/>
-              <a:t>Modélisation </a:t>
-            </a:r>
-            <a:r>
-              <a:rPr lang="fr-FR" dirty="0" smtClean="0"/>
-              <a:t>acausale</a:t>
-            </a:r>
-          </a:p>
-          <a:p>
-            <a:pPr lvl="2"/>
-            <a:r>
-              <a:rPr lang="fr-FR" dirty="0" smtClean="0"/>
-              <a:t>Symbolisation des constituants dédiés à la technologie utilisée (respect des normes, respect des connecteurs E/S, grandeurs physiques + polarité…)</a:t>
-            </a:r>
-          </a:p>
-          <a:p>
-            <a:pPr lvl="2"/>
-            <a:r>
-              <a:rPr lang="fr-FR" dirty="0" smtClean="0"/>
-              <a:t>Le modèle de connaissance n’est pas exigible, mais il faut maîtriser les paramètres caractérisant le comportement du constituant</a:t>
-            </a:r>
-          </a:p>
-          <a:p>
-            <a:pPr lvl="2"/>
-            <a:r>
-              <a:rPr lang="fr-FR" dirty="0" smtClean="0"/>
-              <a:t>Liens non orientés entre les blocs (Comparaison des modélisation causale et acausale sur une résistance</a:t>
-            </a:r>
-            <a:r>
-              <a:rPr lang="fr-FR" dirty="0" smtClean="0"/>
-              <a:t>)  Différence « Affectation / Équation ». Liens avec le diagramme paramétrique.</a:t>
-            </a:r>
-          </a:p>
-          <a:p>
-            <a:pPr lvl="2"/>
-            <a:r>
-              <a:rPr lang="fr-FR" dirty="0" smtClean="0"/>
-              <a:t>Ouvertures sur la réversibilité (réversibilité des composants, réversibilité des systèmes)</a:t>
-            </a:r>
-          </a:p>
-          <a:p>
-            <a:pPr lvl="2"/>
-            <a:r>
-              <a:rPr lang="fr-FR" dirty="0" smtClean="0"/>
-              <a:t>Le modèle n’impose pas de démarche de résolution. Le solveur se charge d’optimiser les calculs.  </a:t>
-            </a:r>
-            <a:endParaRPr lang="fr-FR" dirty="0" smtClean="0"/>
-          </a:p>
-        </p:txBody>
-      </p:sp>
-      <p:sp>
-        <p:nvSpPr>
-          <p:cNvPr id="4" name="Espace réservé du numéro de diapositive 3"/>
-          <p:cNvSpPr>
-            <a:spLocks noGrp="1"/>
-          </p:cNvSpPr>
-          <p:nvPr>
-            <p:ph type="sldNum" sz="quarter" idx="15"/>
-          </p:nvPr>
-        </p:nvSpPr>
-        <p:spPr/>
-        <p:txBody>
-          <a:bodyPr/>
-          <a:lstStyle/>
-          <a:p>
-            <a:fld id="{136A7F36-7A21-4EA8-9DC2-F00219448035}" type="slidenum">
-              <a:rPr lang="fr-FR" smtClean="0"/>
-              <a:t>2</a:t>
-            </a:fld>
-            <a:endParaRPr lang="fr-FR"/>
-          </a:p>
-        </p:txBody>
-      </p:sp>
-    </p:spTree>
-    <p:extLst>
-      <p:ext uri="{BB962C8B-B14F-4D97-AF65-F5344CB8AC3E}">
-        <p14:creationId xmlns:p14="http://schemas.microsoft.com/office/powerpoint/2010/main" val="3520046662"/>
-      </p:ext>
-    </p:extLst>
-  </p:cSld>
-  <p:clrMapOvr>
-    <a:masterClrMapping/>
-  </p:clrMapOvr>
-</p:sld>
-</file>
-
-<file path=ppt/slides/slide20.xml><?xml version="1.0" encoding="utf-8"?>
-<p:sld xmlns:a="http://schemas.openxmlformats.org/drawingml/2006/main" xmlns:r="http://schemas.openxmlformats.org/officeDocument/2006/relationships" xmlns:p="http://schemas.openxmlformats.org/presentationml/2006/main">
-  <p:cSld>
-    <p:spTree>
-      <p:nvGrpSpPr>
-        <p:cNvPr id="1" name=""/>
-        <p:cNvGrpSpPr/>
-        <p:nvPr/>
-      </p:nvGrpSpPr>
-      <p:grpSpPr>
-        <a:xfrm>
-          <a:off x="0" y="0"/>
-          <a:ext cx="0" cy="0"/>
-          <a:chOff x="0" y="0"/>
-          <a:chExt cx="0" cy="0"/>
-        </a:xfrm>
-      </p:grpSpPr>
-      <p:sp>
-        <p:nvSpPr>
-          <p:cNvPr id="2" name="Titre 1"/>
-          <p:cNvSpPr>
-            <a:spLocks noGrp="1"/>
-          </p:cNvSpPr>
-          <p:nvPr>
-            <p:ph type="title"/>
-          </p:nvPr>
-        </p:nvSpPr>
-        <p:spPr/>
-        <p:txBody>
-          <a:bodyPr/>
-          <a:lstStyle/>
-          <a:p>
-            <a:r>
-              <a:rPr lang="fr-FR" dirty="0" smtClean="0"/>
-              <a:t>Modélisation d’un système de laboratoire</a:t>
-            </a:r>
-            <a:endParaRPr lang="fr-FR" dirty="0"/>
-          </a:p>
-        </p:txBody>
-      </p:sp>
-      <p:sp>
-        <p:nvSpPr>
-          <p:cNvPr id="3" name="Espace réservé du texte 2"/>
-          <p:cNvSpPr>
-            <a:spLocks noGrp="1"/>
-          </p:cNvSpPr>
-          <p:nvPr>
-            <p:ph type="body" idx="1"/>
-          </p:nvPr>
-        </p:nvSpPr>
-        <p:spPr/>
-        <p:txBody>
-          <a:bodyPr/>
-          <a:lstStyle/>
-          <a:p>
-            <a:r>
-              <a:rPr lang="fr-FR" dirty="0" smtClean="0"/>
-              <a:t>Pilote automatique TP 30</a:t>
-            </a:r>
-            <a:endParaRPr lang="fr-FR" dirty="0"/>
-          </a:p>
-        </p:txBody>
-      </p:sp>
-      <p:sp>
-        <p:nvSpPr>
-          <p:cNvPr id="4" name="Espace réservé du numéro de diapositive 3"/>
-          <p:cNvSpPr>
-            <a:spLocks noGrp="1"/>
-          </p:cNvSpPr>
-          <p:nvPr>
-            <p:ph type="sldNum" sz="quarter" idx="12"/>
-          </p:nvPr>
-        </p:nvSpPr>
-        <p:spPr/>
-        <p:txBody>
-          <a:bodyPr/>
-          <a:lstStyle/>
-          <a:p>
-            <a:fld id="{136A7F36-7A21-4EA8-9DC2-F00219448035}" type="slidenum">
-              <a:rPr lang="fr-FR" smtClean="0"/>
-              <a:t>20</a:t>
-            </a:fld>
-            <a:endParaRPr lang="fr-FR"/>
-          </a:p>
-        </p:txBody>
-      </p:sp>
-    </p:spTree>
-    <p:extLst>
-      <p:ext uri="{BB962C8B-B14F-4D97-AF65-F5344CB8AC3E}">
-        <p14:creationId xmlns:p14="http://schemas.microsoft.com/office/powerpoint/2010/main" val="3672452185"/>
-      </p:ext>
-    </p:extLst>
-  </p:cSld>
-  <p:clrMapOvr>
-    <a:masterClrMapping/>
-  </p:clrMapOvr>
-</p:sld>
-</file>
-
-<file path=ppt/slides/slide21.xml><?xml version="1.0" encoding="utf-8"?>
-<p:sld xmlns:a="http://schemas.openxmlformats.org/drawingml/2006/main" xmlns:r="http://schemas.openxmlformats.org/officeDocument/2006/relationships" xmlns:p="http://schemas.openxmlformats.org/presentationml/2006/main">
-  <p:cSld>
-    <p:spTree>
-      <p:nvGrpSpPr>
-        <p:cNvPr id="1" name=""/>
-        <p:cNvGrpSpPr/>
-        <p:nvPr/>
-      </p:nvGrpSpPr>
-      <p:grpSpPr>
-        <a:xfrm>
-          <a:off x="0" y="0"/>
-          <a:ext cx="0" cy="0"/>
-          <a:chOff x="0" y="0"/>
-          <a:chExt cx="0" cy="0"/>
-        </a:xfrm>
-      </p:grpSpPr>
-      <p:sp>
-        <p:nvSpPr>
-          <p:cNvPr id="5" name="Titre 4"/>
-          <p:cNvSpPr>
-            <a:spLocks noGrp="1"/>
-          </p:cNvSpPr>
-          <p:nvPr>
-            <p:ph type="title"/>
-          </p:nvPr>
-        </p:nvSpPr>
-        <p:spPr/>
-        <p:txBody>
-          <a:bodyPr>
-            <a:normAutofit fontScale="90000"/>
-          </a:bodyPr>
-          <a:lstStyle/>
-          <a:p>
-            <a:r>
-              <a:rPr lang="fr-FR" dirty="0" smtClean="0"/>
-              <a:t>Pilote Automatique</a:t>
-            </a:r>
-            <a:br>
-              <a:rPr lang="fr-FR" dirty="0" smtClean="0"/>
-            </a:br>
-            <a:r>
-              <a:rPr lang="fr-FR" dirty="0" smtClean="0"/>
-              <a:t>Analyse Interne</a:t>
-            </a:r>
-            <a:endParaRPr lang="fr-FR" dirty="0"/>
-          </a:p>
-        </p:txBody>
-      </p:sp>
-      <p:sp>
-        <p:nvSpPr>
-          <p:cNvPr id="6" name="Espace réservé du contenu 5"/>
-          <p:cNvSpPr>
-            <a:spLocks noGrp="1"/>
-          </p:cNvSpPr>
-          <p:nvPr>
-            <p:ph sz="quarter" idx="1"/>
-          </p:nvPr>
-        </p:nvSpPr>
-        <p:spPr/>
-        <p:txBody>
-          <a:bodyPr/>
-          <a:lstStyle/>
-          <a:p>
-            <a:endParaRPr lang="fr-FR"/>
-          </a:p>
-        </p:txBody>
-      </p:sp>
-      <p:sp>
-        <p:nvSpPr>
-          <p:cNvPr id="4" name="Espace réservé du numéro de diapositive 3"/>
-          <p:cNvSpPr>
-            <a:spLocks noGrp="1"/>
-          </p:cNvSpPr>
-          <p:nvPr>
-            <p:ph type="sldNum" sz="quarter" idx="15"/>
-          </p:nvPr>
-        </p:nvSpPr>
-        <p:spPr/>
-        <p:txBody>
-          <a:bodyPr/>
-          <a:lstStyle/>
-          <a:p>
-            <a:fld id="{136A7F36-7A21-4EA8-9DC2-F00219448035}" type="slidenum">
-              <a:rPr lang="fr-FR" smtClean="0"/>
-              <a:t>21</a:t>
-            </a:fld>
-            <a:endParaRPr lang="fr-FR"/>
-          </a:p>
-        </p:txBody>
-      </p:sp>
-    </p:spTree>
-    <p:extLst>
-      <p:ext uri="{BB962C8B-B14F-4D97-AF65-F5344CB8AC3E}">
-        <p14:creationId xmlns:p14="http://schemas.microsoft.com/office/powerpoint/2010/main" val="601726295"/>
-      </p:ext>
-    </p:extLst>
-  </p:cSld>
-  <p:clrMapOvr>
-    <a:masterClrMapping/>
-  </p:clrMapOvr>
-</p:sld>
-</file>
-
 <file path=ppt/slides/slide22.xml><?xml version="1.0" encoding="utf-8"?>
 <p:sld xmlns:a="http://schemas.openxmlformats.org/drawingml/2006/main" xmlns:r="http://schemas.openxmlformats.org/officeDocument/2006/relationships" xmlns:p="http://schemas.openxmlformats.org/presentationml/2006/main">
   <p:cSld>
@@ -7742,14 +7839,7 @@
           <a:p>
             <a:r>
               <a:rPr lang="fr-FR" dirty="0" smtClean="0"/>
-              <a:t>Pilote Automatique</a:t>
-            </a:r>
-            <a:br>
-              <a:rPr lang="fr-FR" dirty="0" smtClean="0"/>
-            </a:br>
-            <a:r>
-              <a:rPr lang="fr-FR" dirty="0" smtClean="0"/>
-              <a:t>Modélisation</a:t>
+              <a:t>Modélisation d’un système multiphysique</a:t>
             </a:r>
             <a:endParaRPr lang="fr-FR" dirty="0"/>
           </a:p>
@@ -7800,7 +7890,7 @@
     </p:spTree>
     <p:extLst>
       <p:ext uri="{BB962C8B-B14F-4D97-AF65-F5344CB8AC3E}">
-        <p14:creationId xmlns:p14="http://schemas.microsoft.com/office/powerpoint/2010/main" val="2388859630"/>
+        <p14:creationId xmlns:p14="http://schemas.microsoft.com/office/powerpoint/2010/main" val="1827117536"/>
       </p:ext>
     </p:extLst>
   </p:cSld>
@@ -7846,14 +7936,7 @@
           <a:p>
             <a:r>
               <a:rPr lang="fr-FR" dirty="0" smtClean="0"/>
-              <a:t>Pilote automatique</a:t>
-            </a:r>
-            <a:br>
-              <a:rPr lang="fr-FR" dirty="0" smtClean="0"/>
-            </a:br>
-            <a:r>
-              <a:rPr lang="fr-FR" dirty="0" smtClean="0"/>
-              <a:t>Application pédagogique</a:t>
+              <a:t>Modélisation d’un système multiphysique</a:t>
             </a:r>
             <a:endParaRPr lang="fr-FR" dirty="0"/>
           </a:p>
@@ -7904,7 +7987,7 @@
     </p:spTree>
     <p:extLst>
       <p:ext uri="{BB962C8B-B14F-4D97-AF65-F5344CB8AC3E}">
-        <p14:creationId xmlns:p14="http://schemas.microsoft.com/office/powerpoint/2010/main" val="4068046631"/>
+        <p14:creationId xmlns:p14="http://schemas.microsoft.com/office/powerpoint/2010/main" val="241906218"/>
       </p:ext>
     </p:extLst>
   </p:cSld>
@@ -7933,7 +8016,7 @@
       </p:grpSpPr>
       <p:sp>
         <p:nvSpPr>
-          <p:cNvPr id="4" name="Titre 3"/>
+          <p:cNvPr id="2" name="Titre 1"/>
           <p:cNvSpPr>
             <a:spLocks noGrp="1"/>
           </p:cNvSpPr>
@@ -7947,16 +8030,8 @@
           <a:lstStyle/>
           <a:p>
             <a:r>
-              <a:rPr lang="fr-FR" dirty="0" err="1" smtClean="0"/>
-              <a:t>Xcos</a:t>
-            </a:r>
-            <a:r>
-              <a:rPr lang="fr-FR" dirty="0" smtClean="0"/>
-              <a:t> &amp; </a:t>
-            </a:r>
-            <a:r>
-              <a:rPr lang="fr-FR" dirty="0" err="1" smtClean="0"/>
-              <a:t>Arduino</a:t>
+              <a:rPr lang="fr-FR" dirty="0" smtClean="0"/>
+              <a:t>Modélisation d’un système de laboratoire</a:t>
             </a:r>
             <a:endParaRPr lang="fr-FR" dirty="0"/>
           </a:p>
@@ -7964,7 +8039,7 @@
       </p:sp>
       <p:sp>
         <p:nvSpPr>
-          <p:cNvPr id="5" name="Espace réservé du texte 4"/>
+          <p:cNvPr id="3" name="Espace réservé du texte 2"/>
           <p:cNvSpPr>
             <a:spLocks noGrp="1"/>
           </p:cNvSpPr>
@@ -7977,13 +8052,17 @@
           <a:bodyPr/>
           <a:lstStyle/>
           <a:p>
-            <a:endParaRPr lang="fr-FR"/>
-          </a:p>
-        </p:txBody>
-      </p:sp>
-      <p:sp>
-        <p:nvSpPr>
-          <p:cNvPr id="2" name="Espace réservé du numéro de diapositive 1"/>
+            <a:r>
+              <a:rPr lang="fr-FR" dirty="0" smtClean="0"/>
+              <a:t>Pilote automatique TP 30</a:t>
+            </a:r>
+            <a:endParaRPr lang="fr-FR" dirty="0"/>
+          </a:p>
+        </p:txBody>
+      </p:sp>
+      <p:sp>
+        <p:nvSpPr>
+          <p:cNvPr id="4" name="Espace réservé du numéro de diapositive 3"/>
           <p:cNvSpPr>
             <a:spLocks noGrp="1"/>
           </p:cNvSpPr>
@@ -8007,7 +8086,7 @@
     </p:spTree>
     <p:extLst>
       <p:ext uri="{BB962C8B-B14F-4D97-AF65-F5344CB8AC3E}">
-        <p14:creationId xmlns:p14="http://schemas.microsoft.com/office/powerpoint/2010/main" val="1589319820"/>
+        <p14:creationId xmlns:p14="http://schemas.microsoft.com/office/powerpoint/2010/main" val="3672452185"/>
       </p:ext>
     </p:extLst>
   </p:cSld>
@@ -8036,12 +8115,63 @@
       </p:grpSpPr>
       <p:sp>
         <p:nvSpPr>
+          <p:cNvPr id="5" name="Titre 4"/>
+          <p:cNvSpPr>
+            <a:spLocks noGrp="1"/>
+          </p:cNvSpPr>
+          <p:nvPr>
+            <p:ph type="title"/>
+          </p:nvPr>
+        </p:nvSpPr>
+        <p:spPr/>
+        <p:txBody>
+          <a:bodyPr>
+            <a:normAutofit fontScale="90000"/>
+          </a:bodyPr>
+          <a:lstStyle/>
+          <a:p>
+            <a:r>
+              <a:rPr lang="fr-FR" dirty="0" smtClean="0"/>
+              <a:t>Pilote Automatique</a:t>
+            </a:r>
+            <a:br>
+              <a:rPr lang="fr-FR" dirty="0" smtClean="0"/>
+            </a:br>
+            <a:r>
+              <a:rPr lang="fr-FR" dirty="0" smtClean="0"/>
+              <a:t>Analyse Interne</a:t>
+            </a:r>
+            <a:endParaRPr lang="fr-FR" dirty="0"/>
+          </a:p>
+        </p:txBody>
+      </p:sp>
+      <p:sp>
+        <p:nvSpPr>
+          <p:cNvPr id="6" name="Espace réservé du contenu 5"/>
+          <p:cNvSpPr>
+            <a:spLocks noGrp="1"/>
+          </p:cNvSpPr>
+          <p:nvPr>
+            <p:ph sz="quarter" idx="1"/>
+          </p:nvPr>
+        </p:nvSpPr>
+        <p:spPr/>
+        <p:txBody>
+          <a:bodyPr/>
+          <a:lstStyle/>
+          <a:p>
+            <a:endParaRPr lang="fr-FR"/>
+          </a:p>
+        </p:txBody>
+      </p:sp>
+      <p:sp>
+        <p:nvSpPr>
           <p:cNvPr id="4" name="Espace réservé du numéro de diapositive 3"/>
           <p:cNvSpPr>
             <a:spLocks noGrp="1"/>
           </p:cNvSpPr>
           <p:nvPr>
-            <p:ph type="sldNum" sz="quarter" idx="12"/>
+            <p:ph type="sldNum" sz="quarter" idx="15"/>
           </p:nvPr>
         </p:nvSpPr>
         <p:spPr/>
@@ -8052,6 +8182,370 @@
             <a:fld id="{136A7F36-7A21-4EA8-9DC2-F00219448035}" type="slidenum">
               <a:rPr lang="fr-FR" smtClean="0"/>
               <a:t>25</a:t>
+            </a:fld>
+            <a:endParaRPr lang="fr-FR"/>
+          </a:p>
+        </p:txBody>
+      </p:sp>
+    </p:spTree>
+    <p:extLst>
+      <p:ext uri="{BB962C8B-B14F-4D97-AF65-F5344CB8AC3E}">
+        <p14:creationId xmlns:p14="http://schemas.microsoft.com/office/powerpoint/2010/main" val="601726295"/>
+      </p:ext>
+    </p:extLst>
+  </p:cSld>
+  <p:clrMapOvr>
+    <a:masterClrMapping/>
+  </p:clrMapOvr>
+</p:sld>
+</file>
+
+<file path=ppt/slides/slide26.xml><?xml version="1.0" encoding="utf-8"?>
+<p:sld xmlns:a="http://schemas.openxmlformats.org/drawingml/2006/main" xmlns:r="http://schemas.openxmlformats.org/officeDocument/2006/relationships" xmlns:p="http://schemas.openxmlformats.org/presentationml/2006/main">
+  <p:cSld>
+    <p:spTree>
+      <p:nvGrpSpPr>
+        <p:cNvPr id="1" name=""/>
+        <p:cNvGrpSpPr/>
+        <p:nvPr/>
+      </p:nvGrpSpPr>
+      <p:grpSpPr>
+        <a:xfrm>
+          <a:off x="0" y="0"/>
+          <a:ext cx="0" cy="0"/>
+          <a:chOff x="0" y="0"/>
+          <a:chExt cx="0" cy="0"/>
+        </a:xfrm>
+      </p:grpSpPr>
+      <p:sp>
+        <p:nvSpPr>
+          <p:cNvPr id="2" name="Titre 1"/>
+          <p:cNvSpPr>
+            <a:spLocks noGrp="1"/>
+          </p:cNvSpPr>
+          <p:nvPr>
+            <p:ph type="title"/>
+          </p:nvPr>
+        </p:nvSpPr>
+        <p:spPr/>
+        <p:txBody>
+          <a:bodyPr>
+            <a:normAutofit fontScale="90000"/>
+          </a:bodyPr>
+          <a:lstStyle/>
+          <a:p>
+            <a:r>
+              <a:rPr lang="fr-FR" dirty="0" smtClean="0"/>
+              <a:t>Pilote Automatique</a:t>
+            </a:r>
+            <a:br>
+              <a:rPr lang="fr-FR" dirty="0" smtClean="0"/>
+            </a:br>
+            <a:r>
+              <a:rPr lang="fr-FR" dirty="0" smtClean="0"/>
+              <a:t>Modélisation</a:t>
+            </a:r>
+            <a:endParaRPr lang="fr-FR" dirty="0"/>
+          </a:p>
+        </p:txBody>
+      </p:sp>
+      <p:sp>
+        <p:nvSpPr>
+          <p:cNvPr id="3" name="Espace réservé du contenu 2"/>
+          <p:cNvSpPr>
+            <a:spLocks noGrp="1"/>
+          </p:cNvSpPr>
+          <p:nvPr>
+            <p:ph sz="quarter" idx="1"/>
+          </p:nvPr>
+        </p:nvSpPr>
+        <p:spPr/>
+        <p:txBody>
+          <a:bodyPr/>
+          <a:lstStyle/>
+          <a:p>
+            <a:endParaRPr lang="fr-FR"/>
+          </a:p>
+        </p:txBody>
+      </p:sp>
+      <p:sp>
+        <p:nvSpPr>
+          <p:cNvPr id="4" name="Espace réservé du numéro de diapositive 3"/>
+          <p:cNvSpPr>
+            <a:spLocks noGrp="1"/>
+          </p:cNvSpPr>
+          <p:nvPr>
+            <p:ph type="sldNum" sz="quarter" idx="15"/>
+          </p:nvPr>
+        </p:nvSpPr>
+        <p:spPr/>
+        <p:txBody>
+          <a:bodyPr/>
+          <a:lstStyle/>
+          <a:p>
+            <a:fld id="{136A7F36-7A21-4EA8-9DC2-F00219448035}" type="slidenum">
+              <a:rPr lang="fr-FR" smtClean="0"/>
+              <a:t>26</a:t>
+            </a:fld>
+            <a:endParaRPr lang="fr-FR"/>
+          </a:p>
+        </p:txBody>
+      </p:sp>
+    </p:spTree>
+    <p:extLst>
+      <p:ext uri="{BB962C8B-B14F-4D97-AF65-F5344CB8AC3E}">
+        <p14:creationId xmlns:p14="http://schemas.microsoft.com/office/powerpoint/2010/main" val="2388859630"/>
+      </p:ext>
+    </p:extLst>
+  </p:cSld>
+  <p:clrMapOvr>
+    <a:masterClrMapping/>
+  </p:clrMapOvr>
+</p:sld>
+</file>
+
+<file path=ppt/slides/slide27.xml><?xml version="1.0" encoding="utf-8"?>
+<p:sld xmlns:a="http://schemas.openxmlformats.org/drawingml/2006/main" xmlns:r="http://schemas.openxmlformats.org/officeDocument/2006/relationships" xmlns:p="http://schemas.openxmlformats.org/presentationml/2006/main">
+  <p:cSld>
+    <p:spTree>
+      <p:nvGrpSpPr>
+        <p:cNvPr id="1" name=""/>
+        <p:cNvGrpSpPr/>
+        <p:nvPr/>
+      </p:nvGrpSpPr>
+      <p:grpSpPr>
+        <a:xfrm>
+          <a:off x="0" y="0"/>
+          <a:ext cx="0" cy="0"/>
+          <a:chOff x="0" y="0"/>
+          <a:chExt cx="0" cy="0"/>
+        </a:xfrm>
+      </p:grpSpPr>
+      <p:sp>
+        <p:nvSpPr>
+          <p:cNvPr id="2" name="Titre 1"/>
+          <p:cNvSpPr>
+            <a:spLocks noGrp="1"/>
+          </p:cNvSpPr>
+          <p:nvPr>
+            <p:ph type="title"/>
+          </p:nvPr>
+        </p:nvSpPr>
+        <p:spPr/>
+        <p:txBody>
+          <a:bodyPr>
+            <a:normAutofit fontScale="90000"/>
+          </a:bodyPr>
+          <a:lstStyle/>
+          <a:p>
+            <a:r>
+              <a:rPr lang="fr-FR" dirty="0" smtClean="0"/>
+              <a:t>Pilote automatique</a:t>
+            </a:r>
+            <a:br>
+              <a:rPr lang="fr-FR" dirty="0" smtClean="0"/>
+            </a:br>
+            <a:r>
+              <a:rPr lang="fr-FR" dirty="0" smtClean="0"/>
+              <a:t>Application pédagogique</a:t>
+            </a:r>
+            <a:endParaRPr lang="fr-FR" dirty="0"/>
+          </a:p>
+        </p:txBody>
+      </p:sp>
+      <p:sp>
+        <p:nvSpPr>
+          <p:cNvPr id="3" name="Espace réservé du contenu 2"/>
+          <p:cNvSpPr>
+            <a:spLocks noGrp="1"/>
+          </p:cNvSpPr>
+          <p:nvPr>
+            <p:ph sz="quarter" idx="1"/>
+          </p:nvPr>
+        </p:nvSpPr>
+        <p:spPr/>
+        <p:txBody>
+          <a:bodyPr/>
+          <a:lstStyle/>
+          <a:p>
+            <a:endParaRPr lang="fr-FR"/>
+          </a:p>
+        </p:txBody>
+      </p:sp>
+      <p:sp>
+        <p:nvSpPr>
+          <p:cNvPr id="4" name="Espace réservé du numéro de diapositive 3"/>
+          <p:cNvSpPr>
+            <a:spLocks noGrp="1"/>
+          </p:cNvSpPr>
+          <p:nvPr>
+            <p:ph type="sldNum" sz="quarter" idx="15"/>
+          </p:nvPr>
+        </p:nvSpPr>
+        <p:spPr/>
+        <p:txBody>
+          <a:bodyPr/>
+          <a:lstStyle/>
+          <a:p>
+            <a:fld id="{136A7F36-7A21-4EA8-9DC2-F00219448035}" type="slidenum">
+              <a:rPr lang="fr-FR" smtClean="0"/>
+              <a:t>27</a:t>
+            </a:fld>
+            <a:endParaRPr lang="fr-FR"/>
+          </a:p>
+        </p:txBody>
+      </p:sp>
+    </p:spTree>
+    <p:extLst>
+      <p:ext uri="{BB962C8B-B14F-4D97-AF65-F5344CB8AC3E}">
+        <p14:creationId xmlns:p14="http://schemas.microsoft.com/office/powerpoint/2010/main" val="4068046631"/>
+      </p:ext>
+    </p:extLst>
+  </p:cSld>
+  <p:clrMapOvr>
+    <a:masterClrMapping/>
+  </p:clrMapOvr>
+</p:sld>
+</file>
+
+<file path=ppt/slides/slide28.xml><?xml version="1.0" encoding="utf-8"?>
+<p:sld xmlns:a="http://schemas.openxmlformats.org/drawingml/2006/main" xmlns:r="http://schemas.openxmlformats.org/officeDocument/2006/relationships" xmlns:p="http://schemas.openxmlformats.org/presentationml/2006/main">
+  <p:cSld>
+    <p:spTree>
+      <p:nvGrpSpPr>
+        <p:cNvPr id="1" name=""/>
+        <p:cNvGrpSpPr/>
+        <p:nvPr/>
+      </p:nvGrpSpPr>
+      <p:grpSpPr>
+        <a:xfrm>
+          <a:off x="0" y="0"/>
+          <a:ext cx="0" cy="0"/>
+          <a:chOff x="0" y="0"/>
+          <a:chExt cx="0" cy="0"/>
+        </a:xfrm>
+      </p:grpSpPr>
+      <p:sp>
+        <p:nvSpPr>
+          <p:cNvPr id="4" name="Titre 3"/>
+          <p:cNvSpPr>
+            <a:spLocks noGrp="1"/>
+          </p:cNvSpPr>
+          <p:nvPr>
+            <p:ph type="title"/>
+          </p:nvPr>
+        </p:nvSpPr>
+        <p:spPr/>
+        <p:txBody>
+          <a:bodyPr/>
+          <a:lstStyle/>
+          <a:p>
+            <a:r>
+              <a:rPr lang="fr-FR" dirty="0" err="1" smtClean="0"/>
+              <a:t>Xcos</a:t>
+            </a:r>
+            <a:r>
+              <a:rPr lang="fr-FR" dirty="0" smtClean="0"/>
+              <a:t> &amp; </a:t>
+            </a:r>
+            <a:r>
+              <a:rPr lang="fr-FR" dirty="0" err="1" smtClean="0"/>
+              <a:t>Arduino</a:t>
+            </a:r>
+            <a:endParaRPr lang="fr-FR" dirty="0"/>
+          </a:p>
+        </p:txBody>
+      </p:sp>
+      <p:sp>
+        <p:nvSpPr>
+          <p:cNvPr id="5" name="Espace réservé du texte 4"/>
+          <p:cNvSpPr>
+            <a:spLocks noGrp="1"/>
+          </p:cNvSpPr>
+          <p:nvPr>
+            <p:ph type="body" idx="1"/>
+          </p:nvPr>
+        </p:nvSpPr>
+        <p:spPr/>
+        <p:txBody>
+          <a:bodyPr/>
+          <a:lstStyle/>
+          <a:p>
+            <a:endParaRPr lang="fr-FR"/>
+          </a:p>
+        </p:txBody>
+      </p:sp>
+      <p:sp>
+        <p:nvSpPr>
+          <p:cNvPr id="2" name="Espace réservé du numéro de diapositive 1"/>
+          <p:cNvSpPr>
+            <a:spLocks noGrp="1"/>
+          </p:cNvSpPr>
+          <p:nvPr>
+            <p:ph type="sldNum" sz="quarter" idx="12"/>
+          </p:nvPr>
+        </p:nvSpPr>
+        <p:spPr/>
+        <p:txBody>
+          <a:bodyPr/>
+          <a:lstStyle/>
+          <a:p>
+            <a:fld id="{136A7F36-7A21-4EA8-9DC2-F00219448035}" type="slidenum">
+              <a:rPr lang="fr-FR" smtClean="0"/>
+              <a:t>28</a:t>
+            </a:fld>
+            <a:endParaRPr lang="fr-FR"/>
+          </a:p>
+        </p:txBody>
+      </p:sp>
+    </p:spTree>
+    <p:extLst>
+      <p:ext uri="{BB962C8B-B14F-4D97-AF65-F5344CB8AC3E}">
+        <p14:creationId xmlns:p14="http://schemas.microsoft.com/office/powerpoint/2010/main" val="1589319820"/>
+      </p:ext>
+    </p:extLst>
+  </p:cSld>
+  <p:clrMapOvr>
+    <a:masterClrMapping/>
+  </p:clrMapOvr>
+</p:sld>
+</file>
+
+<file path=ppt/slides/slide29.xml><?xml version="1.0" encoding="utf-8"?>
+<p:sld xmlns:a="http://schemas.openxmlformats.org/drawingml/2006/main" xmlns:r="http://schemas.openxmlformats.org/officeDocument/2006/relationships" xmlns:p="http://schemas.openxmlformats.org/presentationml/2006/main">
+  <p:cSld>
+    <p:spTree>
+      <p:nvGrpSpPr>
+        <p:cNvPr id="1" name=""/>
+        <p:cNvGrpSpPr/>
+        <p:nvPr/>
+      </p:nvGrpSpPr>
+      <p:grpSpPr>
+        <a:xfrm>
+          <a:off x="0" y="0"/>
+          <a:ext cx="0" cy="0"/>
+          <a:chOff x="0" y="0"/>
+          <a:chExt cx="0" cy="0"/>
+        </a:xfrm>
+      </p:grpSpPr>
+      <p:sp>
+        <p:nvSpPr>
+          <p:cNvPr id="4" name="Espace réservé du numéro de diapositive 3"/>
+          <p:cNvSpPr>
+            <a:spLocks noGrp="1"/>
+          </p:cNvSpPr>
+          <p:nvPr>
+            <p:ph type="sldNum" sz="quarter" idx="12"/>
+          </p:nvPr>
+        </p:nvSpPr>
+        <p:spPr/>
+        <p:txBody>
+          <a:bodyPr/>
+          <a:lstStyle/>
+          <a:p>
+            <a:fld id="{136A7F36-7A21-4EA8-9DC2-F00219448035}" type="slidenum">
+              <a:rPr lang="fr-FR" smtClean="0"/>
+              <a:t>29</a:t>
             </a:fld>
             <a:endParaRPr lang="fr-FR"/>
           </a:p>
@@ -9316,11 +9810,7 @@
             <a:pPr lvl="1"/>
             <a:r>
               <a:rPr lang="fr-FR" dirty="0" smtClean="0"/>
-              <a:t>Le </a:t>
-            </a:r>
-            <a:r>
-              <a:rPr lang="fr-FR" dirty="0" smtClean="0"/>
-              <a:t>module SIMM/</a:t>
+              <a:t>Le module SIMM/</a:t>
             </a:r>
             <a:r>
               <a:rPr lang="fr-FR" dirty="0" err="1" smtClean="0"/>
@@ -9369,7 +9859,6 @@
               <a:rPr lang="fr-FR" dirty="0" smtClean="0"/>
               <a:t>Possibilité bibliothèque thermique</a:t>
             </a:r>
-            <a:endParaRPr lang="fr-FR" dirty="0" smtClean="0"/>
           </a:p>
           <a:p>
             <a:pPr lvl="2"/>
@@ -9385,7 +9874,6 @@
               <a:rPr lang="fr-FR" dirty="0" smtClean="0"/>
               <a:t>  …</a:t>
             </a:r>
-            <a:endParaRPr lang="fr-FR" dirty="0" smtClean="0"/>
           </a:p>
           <a:p>
             <a:pPr lvl="2"/>
@@ -9393,7 +9881,6 @@
               <a:rPr lang="fr-FR" dirty="0" smtClean="0"/>
               <a:t>Bilan échantillonnage de la résolution</a:t>
             </a:r>
-            <a:endParaRPr lang="fr-FR" dirty="0" smtClean="0"/>
           </a:p>
           <a:p>
             <a:pPr lvl="2"/>
@@ -9441,7 +9928,6 @@
               <a:rPr lang="fr-FR" dirty="0" smtClean="0"/>
               <a:t>?</a:t>
             </a:r>
-            <a:endParaRPr lang="fr-FR" dirty="0" smtClean="0"/>
           </a:p>
           <a:p>
             <a:endParaRPr lang="fr-FR" dirty="0" smtClean="0"/>
@@ -9606,7 +10092,7 @@
       </p:grpSpPr>
       <p:sp>
         <p:nvSpPr>
-          <p:cNvPr id="5" name="Titre 4"/>
+          <p:cNvPr id="2" name="Titre 1"/>
           <p:cNvSpPr>
             <a:spLocks noGrp="1"/>
           </p:cNvSpPr>
@@ -9630,108 +10116,7 @@
             </a:br>
             <a:r>
               <a:rPr lang="fr-FR" dirty="0" smtClean="0"/>
-              <a:t>Tentatives de définitions</a:t>
-            </a:r>
-            <a:endParaRPr lang="fr-FR" dirty="0"/>
-          </a:p>
-        </p:txBody>
-      </p:sp>
-      <p:sp>
-        <p:nvSpPr>
-          <p:cNvPr id="6" name="Espace réservé du contenu 5"/>
-          <p:cNvSpPr>
-            <a:spLocks noGrp="1"/>
-          </p:cNvSpPr>
-          <p:nvPr>
-            <p:ph sz="quarter" idx="1"/>
-          </p:nvPr>
-        </p:nvSpPr>
-        <p:spPr/>
-        <p:txBody>
-          <a:bodyPr>
-            <a:normAutofit fontScale="92500"/>
-          </a:bodyPr>
-          <a:lstStyle/>
-          <a:p>
-            <a:r>
-              <a:rPr lang="fr-FR" dirty="0" smtClean="0"/>
-              <a:t>La modélisation multiphysique en SII</a:t>
-            </a:r>
-          </a:p>
-          <a:p>
-            <a:pPr lvl="1"/>
-            <a:r>
-              <a:rPr lang="fr-FR" dirty="0" smtClean="0"/>
-              <a:t>Modélisation d’un système </a:t>
-            </a:r>
-            <a:r>
-              <a:rPr lang="fr-FR" dirty="0" smtClean="0"/>
-              <a:t>pluri technologique </a:t>
-            </a:r>
-            <a:r>
-              <a:rPr lang="fr-FR" dirty="0" smtClean="0"/>
-              <a:t>en intégrant tous les domaines de la physique nécessaires au fonctionnement de ce système</a:t>
-            </a:r>
-          </a:p>
-          <a:p>
-            <a:endParaRPr lang="fr-FR" dirty="0"/>
-          </a:p>
-          <a:p>
-            <a:r>
-              <a:rPr lang="fr-FR" dirty="0" smtClean="0"/>
-              <a:t>La modélisation multiphysique et </a:t>
-            </a:r>
-            <a:r>
-              <a:rPr lang="fr-FR" dirty="0" smtClean="0"/>
-              <a:t>multi échelle </a:t>
-            </a:r>
-            <a:r>
-              <a:rPr lang="fr-FR" dirty="0" smtClean="0"/>
-              <a:t>dans la recherche</a:t>
-            </a:r>
-          </a:p>
-          <a:p>
-            <a:pPr lvl="1"/>
-            <a:r>
-              <a:rPr lang="fr-FR" dirty="0" smtClean="0"/>
-              <a:t>La modélisation multiphysique permet de de prendre en compte les couplages entre phénomènes physiques différents (couplage mécanique – chimique, couplage mécanique des structures – neutronique – </a:t>
-            </a:r>
-            <a:r>
-              <a:rPr lang="fr-FR" dirty="0" smtClean="0"/>
-              <a:t>thermo hydraulique </a:t>
-            </a:r>
-            <a:r>
-              <a:rPr lang="fr-FR" dirty="0" smtClean="0"/>
-              <a:t>dans la physique des réacteurs …)</a:t>
-            </a:r>
-          </a:p>
-          <a:p>
-            <a:pPr lvl="1"/>
-            <a:r>
-              <a:rPr lang="fr-FR" dirty="0" smtClean="0"/>
-              <a:t>La modélisation </a:t>
-            </a:r>
-            <a:r>
-              <a:rPr lang="fr-FR" dirty="0" smtClean="0"/>
-              <a:t>multi échelle </a:t>
-            </a:r>
-            <a:r>
-              <a:rPr lang="fr-FR" dirty="0" smtClean="0"/>
-              <a:t>permet, grâce au calcul numérique, de déduire des propriétés macroscopiques à partir de modèles microscopiques</a:t>
-            </a:r>
-          </a:p>
-          <a:p>
-            <a:pPr lvl="2"/>
-            <a:r>
-              <a:rPr lang="fr-FR" dirty="0" smtClean="0"/>
-              <a:t>Utilisation complémentaires de modèles probabilistes</a:t>
-            </a:r>
-          </a:p>
-          <a:p>
-            <a:pPr lvl="1"/>
-            <a:r>
-              <a:rPr lang="fr-FR" dirty="0" smtClean="0"/>
-              <a:t>Problèmes de compatibilité et de cohérences des codes de calcul</a:t>
+              <a:t>Positionnement dans l’enseignement des SII</a:t>
             </a:r>
             <a:endParaRPr lang="fr-FR" dirty="0"/>
           </a:p>
@@ -9760,10 +10145,74 @@
           </a:p>
         </p:txBody>
       </p:sp>
+      <p:pic>
+        <p:nvPicPr>
+          <p:cNvPr id="1026" name="Picture 2"/>
+          <p:cNvPicPr>
+            <a:picLocks noChangeAspect="1" noChangeArrowheads="1"/>
+          </p:cNvPicPr>
+          <p:nvPr/>
+        </p:nvPicPr>
+        <p:blipFill>
+          <a:blip r:embed="rId2" cstate="print">
+            <a:extLst>
+              <a:ext uri="{28A0092B-C50C-407E-A947-70E740481C1C}">
+                <a14:useLocalDpi xmlns:a14="http://schemas.microsoft.com/office/drawing/2010/main" val="0"/>
+              </a:ext>
+            </a:extLst>
+          </a:blip>
+          <a:srcRect/>
+          <a:stretch>
+            <a:fillRect/>
+          </a:stretch>
+        </p:blipFill>
+        <p:spPr bwMode="auto">
+          <a:xfrm>
+            <a:off x="250751" y="1268761"/>
+            <a:ext cx="8425705" cy="5483626"/>
+          </a:xfrm>
+          <a:prstGeom prst="rect">
+            <a:avLst/>
+          </a:prstGeom>
+          <a:noFill/>
+          <a:ln>
+            <a:noFill/>
+          </a:ln>
+          <a:effectLst/>
+          <a:extLst>
+            <a:ext uri="{909E8E84-426E-40DD-AFC4-6F175D3DCCD1}">
+              <a14:hiddenFill xmlns:a14="http://schemas.microsoft.com/office/drawing/2010/main">
+                <a:solidFill>
+                  <a:schemeClr val="accent1"/>
+                </a:solidFill>
+              </a14:hiddenFill>
+            </a:ext>
+            <a:ext uri="{91240B29-F687-4F45-9708-019B960494DF}">
+              <a14:hiddenLine xmlns:a14="http://schemas.microsoft.com/office/drawing/2010/main" w="9525">
+                <a:solidFill>
+                  <a:schemeClr val="tx1"/>
+                </a:solidFill>
+                <a:miter lim="800000"/>
+                <a:headEnd/>
+                <a:tailEnd/>
+              </a14:hiddenLine>
+            </a:ext>
+            <a:ext uri="{AF507438-7753-43E0-B8FC-AC1667EBCBE1}">
+              <a14:hiddenEffects xmlns:a14="http://schemas.microsoft.com/office/drawing/2010/main">
+                <a:effectLst>
+                  <a:outerShdw dist="35921" dir="2700000" algn="ctr" rotWithShape="0">
+                    <a:schemeClr val="bg2"/>
+                  </a:outerShdw>
+                </a:effectLst>
+              </a14:hiddenEffects>
+            </a:ext>
+          </a:extLst>
+        </p:spPr>
+      </p:pic>
     </p:spTree>
     <p:extLst>
       <p:ext uri="{BB962C8B-B14F-4D97-AF65-F5344CB8AC3E}">
-        <p14:creationId xmlns:p14="http://schemas.microsoft.com/office/powerpoint/2010/main" val="2231398042"/>
+        <p14:creationId xmlns:p14="http://schemas.microsoft.com/office/powerpoint/2010/main" val="180591065"/>
       </p:ext>
     </p:extLst>
   </p:cSld>
@@ -9792,7 +10241,7 @@
       </p:grpSpPr>
       <p:sp>
         <p:nvSpPr>
-          <p:cNvPr id="2" name="Titre 1"/>
+          <p:cNvPr id="5" name="Titre 4"/>
           <p:cNvSpPr>
             <a:spLocks noGrp="1"/>
           </p:cNvSpPr>
@@ -9816,7 +10265,7 @@
             </a:br>
             <a:r>
               <a:rPr lang="fr-FR" dirty="0" smtClean="0"/>
-              <a:t>Enjeux</a:t>
+              <a:t>Tentatives de définitions</a:t>
             </a:r>
             <a:endParaRPr lang="fr-FR" dirty="0"/>
           </a:p>
@@ -9824,7 +10273,7 @@
       </p:sp>
       <p:sp>
         <p:nvSpPr>
-          <p:cNvPr id="3" name="Espace réservé du contenu 2"/>
+          <p:cNvPr id="6" name="Espace réservé du contenu 5"/>
           <p:cNvSpPr>
             <a:spLocks noGrp="1"/>
           </p:cNvSpPr>
@@ -9834,12 +10283,61 @@
         </p:nvSpPr>
         <p:spPr/>
         <p:txBody>
-          <a:bodyPr/>
-          <a:lstStyle/>
-          <a:p>
-            <a:r>
-              <a:rPr lang="fr-FR" dirty="0" smtClean="0"/>
-              <a:t>Pouvoir simuler le comportement d’un système dans sa globalité </a:t>
+          <a:bodyPr>
+            <a:normAutofit fontScale="92500"/>
+          </a:bodyPr>
+          <a:lstStyle/>
+          <a:p>
+            <a:pPr algn="just"/>
+            <a:r>
+              <a:rPr lang="fr-FR" dirty="0" smtClean="0"/>
+              <a:t>La modélisation multiphysique en SII</a:t>
+            </a:r>
+          </a:p>
+          <a:p>
+            <a:pPr lvl="1" algn="just"/>
+            <a:r>
+              <a:rPr lang="fr-FR" dirty="0" smtClean="0"/>
+              <a:t>Modélisation d’un système pluri technologique en intégrant tous les domaines de la physique nécessaires au fonctionnement de ce système</a:t>
+            </a:r>
+          </a:p>
+          <a:p>
+            <a:pPr algn="just"/>
+            <a:endParaRPr lang="fr-FR" dirty="0"/>
+          </a:p>
+          <a:p>
+            <a:pPr algn="just"/>
+            <a:r>
+              <a:rPr lang="fr-FR" dirty="0" smtClean="0"/>
+              <a:t>La modélisation multiphysique et multi échelle dans la recherche</a:t>
+            </a:r>
+          </a:p>
+          <a:p>
+            <a:pPr lvl="1" algn="just"/>
+            <a:r>
+              <a:rPr lang="fr-FR" dirty="0" smtClean="0"/>
+              <a:t>La modélisation multiphysique permet de de prendre en compte les couplages entre phénomènes physiques différents (couplage mécanique – chimique, couplage mécanique des structures – neutronique – thermo hydraulique dans la physique des réacteurs …)</a:t>
+            </a:r>
+          </a:p>
+          <a:p>
+            <a:pPr lvl="1" algn="just"/>
+            <a:r>
+              <a:rPr lang="fr-FR" dirty="0" smtClean="0"/>
+              <a:t>La modélisation multi échelle permet, grâce au calcul numérique, de déduire des propriétés macroscopiques à partir de modèles microscopiques</a:t>
+            </a:r>
+          </a:p>
+          <a:p>
+            <a:pPr lvl="2" algn="just"/>
+            <a:r>
+              <a:rPr lang="fr-FR" dirty="0" smtClean="0"/>
+              <a:t>Utilisation complémentaires de modèles probabilistes</a:t>
+            </a:r>
+          </a:p>
+          <a:p>
+            <a:pPr lvl="1" algn="just"/>
+            <a:r>
+              <a:rPr lang="fr-FR" dirty="0" smtClean="0"/>
+              <a:t>Problèmes de compatibilité et de cohérences des codes de calcul</a:t>
             </a:r>
             <a:endParaRPr lang="fr-FR" dirty="0"/>
           </a:p>
@@ -9871,7 +10369,7 @@
     </p:spTree>
     <p:extLst>
       <p:ext uri="{BB962C8B-B14F-4D97-AF65-F5344CB8AC3E}">
-        <p14:creationId xmlns:p14="http://schemas.microsoft.com/office/powerpoint/2010/main" val="180591065"/>
+        <p14:creationId xmlns:p14="http://schemas.microsoft.com/office/powerpoint/2010/main" val="2231398042"/>
       </p:ext>
     </p:extLst>
   </p:cSld>
@@ -9924,7 +10422,7 @@
             </a:br>
             <a:r>
               <a:rPr lang="fr-FR" dirty="0" smtClean="0"/>
-              <a:t>Problématiques</a:t>
+              <a:t>Le modèle de connaissance</a:t>
             </a:r>
             <a:endParaRPr lang="fr-FR" dirty="0"/>
           </a:p>
@@ -9942,70 +10440,67 @@
         </p:nvSpPr>
         <p:spPr/>
         <p:txBody>
-          <a:bodyPr/>
-          <a:lstStyle/>
-          <a:p>
-            <a:r>
-              <a:rPr lang="fr-FR" dirty="0" smtClean="0"/>
-              <a:t>Problèmes logiciels</a:t>
+          <a:bodyPr>
+            <a:normAutofit/>
+          </a:bodyPr>
+          <a:lstStyle/>
+          <a:p>
+            <a:r>
+              <a:rPr lang="fr-FR" dirty="0" smtClean="0"/>
+              <a:t>Définition </a:t>
             </a:r>
           </a:p>
           <a:p>
             <a:pPr lvl="1"/>
             <a:r>
               <a:rPr lang="fr-FR" dirty="0" smtClean="0"/>
-              <a:t>Les logiciels utilisés de classiquement en SII sont orientés « </a:t>
-            </a:r>
-            <a:r>
-              <a:rPr lang="fr-FR" dirty="0" err="1" smtClean="0"/>
-              <a:t>monophysique</a:t>
-            </a:r>
-            <a:r>
-              <a:rPr lang="fr-FR" dirty="0" smtClean="0"/>
-              <a:t> ». Il faut donc utiliser des logiciels spécifiques.</a:t>
+              <a:t>Le modèle </a:t>
+            </a:r>
+            <a:r>
+              <a:rPr lang="fr-FR" dirty="0" smtClean="0"/>
+              <a:t>établi </a:t>
+            </a:r>
+            <a:r>
+              <a:rPr lang="fr-FR" dirty="0" smtClean="0"/>
+              <a:t>à partir des lois de la physique ou de la chimie.</a:t>
+            </a:r>
+          </a:p>
+          <a:p>
+            <a:r>
+              <a:rPr lang="fr-FR" dirty="0" smtClean="0"/>
+              <a:t>Objectif</a:t>
             </a:r>
           </a:p>
           <a:p>
             <a:pPr lvl="1"/>
-            <a:endParaRPr lang="fr-FR" dirty="0"/>
-          </a:p>
-          <a:p>
-            <a:r>
-              <a:rPr lang="fr-FR" dirty="0" smtClean="0"/>
-              <a:t>Problèmes pour l’enseignant</a:t>
+            <a:r>
+              <a:rPr lang="fr-FR" dirty="0"/>
+              <a:t>E</a:t>
+            </a:r>
+            <a:r>
+              <a:rPr lang="fr-FR" dirty="0" smtClean="0"/>
+              <a:t>xpliciter le fonctionnement d’un bloc d’un système par une relation mathématique.</a:t>
+            </a:r>
+          </a:p>
+          <a:p>
+            <a:r>
+              <a:rPr lang="fr-FR" dirty="0" smtClean="0"/>
+              <a:t>Problèmes </a:t>
             </a:r>
           </a:p>
           <a:p>
             <a:pPr lvl="1"/>
             <a:r>
               <a:rPr lang="fr-FR" dirty="0" smtClean="0"/>
-              <a:t>Ne maitrisant pas les lois comportementales de tous les champs de la physique, comment modéliser de façon juste un système ?</a:t>
+              <a:t>Complexité de certains modèles</a:t>
             </a:r>
           </a:p>
           <a:p>
             <a:pPr lvl="1"/>
-            <a:endParaRPr lang="fr-FR" dirty="0"/>
-          </a:p>
-          <a:p>
-            <a:r>
-              <a:rPr lang="fr-FR" dirty="0" smtClean="0"/>
-              <a:t>Problèmes de l’élève</a:t>
-            </a:r>
-          </a:p>
-          <a:p>
-            <a:pPr lvl="1"/>
-            <a:r>
-              <a:rPr lang="fr-FR" dirty="0" smtClean="0"/>
-              <a:t>Qu’est-ce que l’élève doit savoir ?</a:t>
-            </a:r>
-          </a:p>
-          <a:p>
-            <a:pPr lvl="1"/>
-            <a:r>
-              <a:rPr lang="fr-FR" dirty="0" smtClean="0"/>
-              <a:t>Qu’est-ce que l’élève doit savoir-faire ?</a:t>
-            </a:r>
-            <a:endParaRPr lang="fr-FR" dirty="0"/>
+            <a:r>
+              <a:rPr lang="fr-FR" dirty="0" smtClean="0"/>
+              <a:t>Identification nécessaires de paramètres</a:t>
+            </a:r>
           </a:p>
         </p:txBody>
       </p:sp>
@@ -10035,7 +10530,7 @@
     </p:spTree>
     <p:extLst>
       <p:ext uri="{BB962C8B-B14F-4D97-AF65-F5344CB8AC3E}">
-        <p14:creationId xmlns:p14="http://schemas.microsoft.com/office/powerpoint/2010/main" val="4081467805"/>
+        <p14:creationId xmlns:p14="http://schemas.microsoft.com/office/powerpoint/2010/main" val="2504809373"/>
       </p:ext>
     </p:extLst>
   </p:cSld>
@@ -10075,66 +10570,887 @@
         <p:spPr/>
         <p:txBody>
           <a:bodyPr>
-            <a:noAutofit/>
+            <a:normAutofit fontScale="90000"/>
           </a:bodyPr>
           <a:lstStyle/>
           <a:p>
             <a:r>
-              <a:rPr lang="fr-FR" sz="2400" dirty="0"/>
+              <a:rPr lang="fr-FR" dirty="0" smtClean="0"/>
               <a:t>Modélisation multiphysique</a:t>
             </a:r>
             <a:br>
-              <a:rPr lang="fr-FR" sz="2400" dirty="0"/>
+              <a:rPr lang="fr-FR" dirty="0" smtClean="0"/>
             </a:br>
             <a:r>
-              <a:rPr lang="fr-FR" sz="2400" dirty="0" smtClean="0"/>
-              <a:t>Modélisation Causale/ Modélisation Acausale</a:t>
-            </a:r>
-            <a:endParaRPr lang="fr-FR" sz="2400" dirty="0"/>
-          </a:p>
-        </p:txBody>
-      </p:sp>
-      <p:sp>
-        <p:nvSpPr>
-          <p:cNvPr id="3" name="Espace réservé du contenu 2"/>
-          <p:cNvSpPr>
-            <a:spLocks noGrp="1"/>
-          </p:cNvSpPr>
-          <p:nvPr>
-            <p:ph sz="quarter" idx="1"/>
-          </p:nvPr>
-        </p:nvSpPr>
-        <p:spPr/>
-        <p:txBody>
-          <a:bodyPr/>
-          <a:lstStyle/>
-          <a:p>
-            <a:r>
-              <a:rPr lang="fr-FR" dirty="0" smtClean="0"/>
-              <a:t>Dans le cadre de nos activités, on distingue la modélisation causale et acausale.</a:t>
-            </a:r>
-          </a:p>
-          <a:p>
+              <a:rPr lang="fr-FR" dirty="0" smtClean="0"/>
+              <a:t>Le modèle de connaissance</a:t>
+            </a:r>
             <a:endParaRPr lang="fr-FR" dirty="0"/>
           </a:p>
-          <a:p>
-            <a:r>
-              <a:rPr lang="fr-FR" dirty="0" smtClean="0"/>
-              <a:t>Les modèles causaux reposent sur une modélisation des systèmes par transformée de Laplace. Les simulations peuvent se faire par la « manipulation » de fonctions rationnelles.</a:t>
-            </a:r>
-          </a:p>
-          <a:p>
-            <a:endParaRPr lang="fr-FR" dirty="0"/>
-          </a:p>
-          <a:p>
-            <a:r>
-              <a:rPr lang="fr-FR" dirty="0" smtClean="0"/>
-              <a:t>Les modèles acausaux reposent sur une modélisation des systèmes par des équations différentielles (sans transformation dans le domaine de Laplace). Les simulations sont réalisée par une résolution numérique des équations différentielles.</a:t>
-            </a:r>
-            <a:endParaRPr lang="fr-FR" dirty="0"/>
-          </a:p>
-        </p:txBody>
-      </p:sp>
+        </p:txBody>
+      </p:sp>
+      <mc:AlternateContent xmlns:mc="http://schemas.openxmlformats.org/markup-compatibility/2006">
+        <mc:Choice xmlns:a14="http://schemas.microsoft.com/office/drawing/2010/main" Requires="a14">
+          <p:sp>
+            <p:nvSpPr>
+              <p:cNvPr id="5" name="Espace réservé du contenu 4"/>
+              <p:cNvSpPr>
+                <a:spLocks noGrp="1"/>
+              </p:cNvSpPr>
+              <p:nvPr>
+                <p:ph sz="quarter" idx="1"/>
+              </p:nvPr>
+            </p:nvSpPr>
+            <p:spPr/>
+            <p:txBody>
+              <a:bodyPr>
+                <a:normAutofit/>
+              </a:bodyPr>
+              <a:lstStyle/>
+              <a:p>
+                <a:r>
+                  <a:rPr lang="fr-FR" dirty="0" smtClean="0"/>
+                  <a:t>Équations électriques</a:t>
+                </a:r>
+              </a:p>
+              <a:p>
+                <a:pPr lvl="1"/>
+                <a:r>
+                  <a:rPr lang="fr-FR" dirty="0" smtClean="0"/>
+                  <a:t>Loi des mailles</a:t>
+                </a:r>
+              </a:p>
+              <a:p>
+                <a:pPr lvl="2"/>
+                <a14:m>
+                  <m:oMath xmlns:m="http://schemas.openxmlformats.org/officeDocument/2006/math">
+                    <m:r>
+                      <a:rPr lang="fr-FR" b="0" i="1" smtClean="0">
+                        <a:latin typeface="Cambria Math"/>
+                      </a:rPr>
+                      <m:t>𝑢</m:t>
+                    </m:r>
+                    <m:d>
+                      <m:dPr>
+                        <m:ctrlPr>
+                          <a:rPr lang="fr-FR" b="0" i="1" smtClean="0">
+                            <a:latin typeface="Cambria Math"/>
+                          </a:rPr>
+                        </m:ctrlPr>
+                      </m:dPr>
+                      <m:e>
+                        <m:r>
+                          <a:rPr lang="fr-FR" b="0" i="1" smtClean="0">
+                            <a:latin typeface="Cambria Math"/>
+                          </a:rPr>
+                          <m:t>𝑡</m:t>
+                        </m:r>
+                      </m:e>
+                    </m:d>
+                    <m:r>
+                      <a:rPr lang="fr-FR" b="0" i="1" smtClean="0">
+                        <a:latin typeface="Cambria Math"/>
+                      </a:rPr>
+                      <m:t>=</m:t>
+                    </m:r>
+                    <m:r>
+                      <a:rPr lang="fr-FR" b="0" i="1" smtClean="0">
+                        <a:latin typeface="Cambria Math"/>
+                      </a:rPr>
+                      <m:t>𝑒</m:t>
+                    </m:r>
+                    <m:d>
+                      <m:dPr>
+                        <m:ctrlPr>
+                          <a:rPr lang="fr-FR" b="0" i="1" smtClean="0">
+                            <a:latin typeface="Cambria Math"/>
+                          </a:rPr>
+                        </m:ctrlPr>
+                      </m:dPr>
+                      <m:e>
+                        <m:r>
+                          <a:rPr lang="fr-FR" b="0" i="1" smtClean="0">
+                            <a:latin typeface="Cambria Math"/>
+                          </a:rPr>
+                          <m:t>𝑡</m:t>
+                        </m:r>
+                      </m:e>
+                    </m:d>
+                    <m:r>
+                      <a:rPr lang="fr-FR" b="0" i="1" smtClean="0">
+                        <a:latin typeface="Cambria Math"/>
+                      </a:rPr>
+                      <m:t>+</m:t>
+                    </m:r>
+                    <m:r>
+                      <a:rPr lang="fr-FR" b="0" i="1" smtClean="0">
+                        <a:latin typeface="Cambria Math"/>
+                      </a:rPr>
+                      <m:t>𝐿</m:t>
+                    </m:r>
+                    <m:f>
+                      <m:fPr>
+                        <m:ctrlPr>
+                          <a:rPr lang="fr-FR" b="0" i="1" smtClean="0">
+                            <a:latin typeface="Cambria Math"/>
+                          </a:rPr>
+                        </m:ctrlPr>
+                      </m:fPr>
+                      <m:num>
+                        <m:r>
+                          <a:rPr lang="fr-FR" b="0" i="1" smtClean="0">
+                            <a:latin typeface="Cambria Math"/>
+                          </a:rPr>
+                          <m:t>𝑑𝑖</m:t>
+                        </m:r>
+                        <m:r>
+                          <a:rPr lang="fr-FR" b="0" i="1" smtClean="0">
+                            <a:latin typeface="Cambria Math"/>
+                          </a:rPr>
+                          <m:t>(</m:t>
+                        </m:r>
+                        <m:r>
+                          <a:rPr lang="fr-FR" b="0" i="1" smtClean="0">
+                            <a:latin typeface="Cambria Math"/>
+                          </a:rPr>
+                          <m:t>𝑡</m:t>
+                        </m:r>
+                        <m:r>
+                          <a:rPr lang="fr-FR" b="0" i="1" smtClean="0">
+                            <a:latin typeface="Cambria Math"/>
+                          </a:rPr>
+                          <m:t>)</m:t>
+                        </m:r>
+                      </m:num>
+                      <m:den>
+                        <m:r>
+                          <a:rPr lang="fr-FR" b="0" i="1" smtClean="0">
+                            <a:latin typeface="Cambria Math"/>
+                          </a:rPr>
+                          <m:t>𝑑𝑡</m:t>
+                        </m:r>
+                      </m:den>
+                    </m:f>
+                    <m:r>
+                      <a:rPr lang="fr-FR" b="0" i="1" smtClean="0">
+                        <a:latin typeface="Cambria Math"/>
+                      </a:rPr>
+                      <m:t>+</m:t>
+                    </m:r>
+                    <m:r>
+                      <a:rPr lang="fr-FR" b="0" i="1" smtClean="0">
+                        <a:latin typeface="Cambria Math"/>
+                      </a:rPr>
+                      <m:t>𝑅𝑖</m:t>
+                    </m:r>
+                    <m:r>
+                      <a:rPr lang="fr-FR" b="0" i="1" smtClean="0">
+                        <a:latin typeface="Cambria Math"/>
+                      </a:rPr>
+                      <m:t>(</m:t>
+                    </m:r>
+                    <m:r>
+                      <a:rPr lang="fr-FR" b="0" i="1" smtClean="0">
+                        <a:latin typeface="Cambria Math"/>
+                      </a:rPr>
+                      <m:t>𝑡</m:t>
+                    </m:r>
+                    <m:r>
+                      <a:rPr lang="fr-FR" b="0" i="1" smtClean="0">
+                        <a:latin typeface="Cambria Math"/>
+                      </a:rPr>
+                      <m:t>)</m:t>
+                    </m:r>
+                  </m:oMath>
+                </a14:m>
+                <a:endParaRPr lang="fr-FR" dirty="0" smtClean="0"/>
+              </a:p>
+              <a:p>
+                <a:r>
+                  <a:rPr lang="fr-FR" dirty="0" smtClean="0"/>
+                  <a:t>Équations mécaniques</a:t>
+                </a:r>
+              </a:p>
+              <a:p>
+                <a:pPr lvl="1"/>
+                <a:r>
+                  <a:rPr lang="fr-FR" dirty="0" smtClean="0"/>
+                  <a:t>Théorème du moment dynamique</a:t>
+                </a:r>
+              </a:p>
+              <a:p>
+                <a:pPr lvl="2"/>
+                <a14:m>
+                  <m:oMath xmlns:m="http://schemas.openxmlformats.org/officeDocument/2006/math">
+                    <m:r>
+                      <a:rPr lang="fr-FR" b="0" i="1" smtClean="0">
+                        <a:latin typeface="Cambria Math"/>
+                      </a:rPr>
+                      <m:t>𝐽</m:t>
+                    </m:r>
+                    <m:f>
+                      <m:fPr>
+                        <m:ctrlPr>
+                          <a:rPr lang="fr-FR" b="0" i="1" smtClean="0">
+                            <a:latin typeface="Cambria Math"/>
+                          </a:rPr>
+                        </m:ctrlPr>
+                      </m:fPr>
+                      <m:num>
+                        <m:r>
+                          <a:rPr lang="fr-FR" b="0" i="1" smtClean="0">
+                            <a:latin typeface="Cambria Math"/>
+                          </a:rPr>
+                          <m:t>𝑑</m:t>
+                        </m:r>
+                        <m:sSub>
+                          <m:sSubPr>
+                            <m:ctrlPr>
+                              <a:rPr lang="fr-FR" b="0" i="1" smtClean="0">
+                                <a:latin typeface="Cambria Math"/>
+                              </a:rPr>
+                            </m:ctrlPr>
+                          </m:sSubPr>
+                          <m:e>
+                            <m:r>
+                              <a:rPr lang="fr-FR" b="0" i="1" smtClean="0">
+                                <a:latin typeface="Cambria Math"/>
+                              </a:rPr>
+                              <m:t>𝜔</m:t>
+                            </m:r>
+                          </m:e>
+                          <m:sub>
+                            <m:r>
+                              <a:rPr lang="fr-FR" b="0" i="1" smtClean="0">
+                                <a:latin typeface="Cambria Math"/>
+                              </a:rPr>
+                              <m:t>𝑚</m:t>
+                            </m:r>
+                          </m:sub>
+                        </m:sSub>
+                        <m:r>
+                          <a:rPr lang="fr-FR" b="0" i="1" smtClean="0">
+                            <a:latin typeface="Cambria Math"/>
+                          </a:rPr>
+                          <m:t>(</m:t>
+                        </m:r>
+                        <m:r>
+                          <a:rPr lang="fr-FR" b="0" i="1" smtClean="0">
+                            <a:latin typeface="Cambria Math"/>
+                          </a:rPr>
+                          <m:t>𝑡</m:t>
+                        </m:r>
+                        <m:r>
+                          <a:rPr lang="fr-FR" b="0" i="1" smtClean="0">
+                            <a:latin typeface="Cambria Math"/>
+                          </a:rPr>
+                          <m:t>)</m:t>
+                        </m:r>
+                      </m:num>
+                      <m:den>
+                        <m:r>
+                          <a:rPr lang="fr-FR" b="0" i="1" smtClean="0">
+                            <a:latin typeface="Cambria Math"/>
+                          </a:rPr>
+                          <m:t>𝑑𝑡</m:t>
+                        </m:r>
+                      </m:den>
+                    </m:f>
+                    <m:r>
+                      <a:rPr lang="fr-FR" b="0" i="1" smtClean="0">
+                        <a:latin typeface="Cambria Math"/>
+                      </a:rPr>
+                      <m:t>=</m:t>
+                    </m:r>
+                    <m:sSub>
+                      <m:sSubPr>
+                        <m:ctrlPr>
+                          <a:rPr lang="fr-FR" b="0" i="1" smtClean="0">
+                            <a:latin typeface="Cambria Math"/>
+                          </a:rPr>
+                        </m:ctrlPr>
+                      </m:sSubPr>
+                      <m:e>
+                        <m:r>
+                          <a:rPr lang="fr-FR" b="0" i="1" smtClean="0">
+                            <a:latin typeface="Cambria Math"/>
+                          </a:rPr>
+                          <m:t>𝑐</m:t>
+                        </m:r>
+                      </m:e>
+                      <m:sub>
+                        <m:r>
+                          <a:rPr lang="fr-FR" b="0" i="1" smtClean="0">
+                            <a:latin typeface="Cambria Math"/>
+                          </a:rPr>
+                          <m:t>𝑚</m:t>
+                        </m:r>
+                      </m:sub>
+                    </m:sSub>
+                    <m:d>
+                      <m:dPr>
+                        <m:ctrlPr>
+                          <a:rPr lang="fr-FR" b="0" i="1" smtClean="0">
+                            <a:latin typeface="Cambria Math"/>
+                          </a:rPr>
+                        </m:ctrlPr>
+                      </m:dPr>
+                      <m:e>
+                        <m:r>
+                          <a:rPr lang="fr-FR" b="0" i="1" smtClean="0">
+                            <a:latin typeface="Cambria Math"/>
+                          </a:rPr>
+                          <m:t>𝑡</m:t>
+                        </m:r>
+                      </m:e>
+                    </m:d>
+                    <m:r>
+                      <a:rPr lang="fr-FR" b="0" i="1" smtClean="0">
+                        <a:latin typeface="Cambria Math"/>
+                      </a:rPr>
+                      <m:t>−</m:t>
+                    </m:r>
+                    <m:sSub>
+                      <m:sSubPr>
+                        <m:ctrlPr>
+                          <a:rPr lang="fr-FR" b="0" i="1" smtClean="0">
+                            <a:latin typeface="Cambria Math"/>
+                          </a:rPr>
+                        </m:ctrlPr>
+                      </m:sSubPr>
+                      <m:e>
+                        <m:r>
+                          <a:rPr lang="fr-FR" b="0" i="1" smtClean="0">
+                            <a:latin typeface="Cambria Math"/>
+                          </a:rPr>
+                          <m:t>𝑐</m:t>
+                        </m:r>
+                      </m:e>
+                      <m:sub>
+                        <m:r>
+                          <a:rPr lang="fr-FR" b="0" i="1" smtClean="0">
+                            <a:latin typeface="Cambria Math"/>
+                          </a:rPr>
+                          <m:t>𝑟</m:t>
+                        </m:r>
+                      </m:sub>
+                    </m:sSub>
+                    <m:r>
+                      <a:rPr lang="fr-FR" b="0" i="1" smtClean="0">
+                        <a:latin typeface="Cambria Math"/>
+                      </a:rPr>
+                      <m:t>(</m:t>
+                    </m:r>
+                    <m:r>
+                      <a:rPr lang="fr-FR" b="0" i="1" smtClean="0">
+                        <a:latin typeface="Cambria Math"/>
+                      </a:rPr>
+                      <m:t>𝑡</m:t>
+                    </m:r>
+                    <m:r>
+                      <a:rPr lang="fr-FR" b="0" i="1" smtClean="0">
+                        <a:latin typeface="Cambria Math"/>
+                      </a:rPr>
+                      <m:t>)</m:t>
+                    </m:r>
+                  </m:oMath>
+                </a14:m>
+                <a:endParaRPr lang="fr-FR" dirty="0" smtClean="0"/>
+              </a:p>
+              <a:p>
+                <a:pPr lvl="1"/>
+                <a:r>
+                  <a:rPr lang="fr-FR" dirty="0" smtClean="0"/>
+                  <a:t>Couple résistant</a:t>
+                </a:r>
+              </a:p>
+              <a:p>
+                <a:pPr lvl="2"/>
+                <a14:m>
+                  <m:oMath xmlns:m="http://schemas.openxmlformats.org/officeDocument/2006/math">
+                    <m:sSub>
+                      <m:sSubPr>
+                        <m:ctrlPr>
+                          <a:rPr lang="fr-FR" b="0" i="1" smtClean="0">
+                            <a:latin typeface="Cambria Math"/>
+                          </a:rPr>
+                        </m:ctrlPr>
+                      </m:sSubPr>
+                      <m:e>
+                        <m:r>
+                          <a:rPr lang="fr-FR" b="0" i="1" smtClean="0">
+                            <a:latin typeface="Cambria Math"/>
+                          </a:rPr>
+                          <m:t>𝑐</m:t>
+                        </m:r>
+                      </m:e>
+                      <m:sub>
+                        <m:r>
+                          <a:rPr lang="fr-FR" b="0" i="1" smtClean="0">
+                            <a:latin typeface="Cambria Math"/>
+                          </a:rPr>
+                          <m:t>𝑟</m:t>
+                        </m:r>
+                      </m:sub>
+                    </m:sSub>
+                    <m:d>
+                      <m:dPr>
+                        <m:ctrlPr>
+                          <a:rPr lang="fr-FR" b="0" i="1" smtClean="0">
+                            <a:latin typeface="Cambria Math"/>
+                          </a:rPr>
+                        </m:ctrlPr>
+                      </m:dPr>
+                      <m:e>
+                        <m:r>
+                          <a:rPr lang="fr-FR" b="0" i="1" smtClean="0">
+                            <a:latin typeface="Cambria Math"/>
+                          </a:rPr>
+                          <m:t>𝑡</m:t>
+                        </m:r>
+                      </m:e>
+                    </m:d>
+                    <m:r>
+                      <a:rPr lang="fr-FR" b="0" i="1" smtClean="0">
+                        <a:latin typeface="Cambria Math"/>
+                      </a:rPr>
+                      <m:t>=</m:t>
+                    </m:r>
+                    <m:sSub>
+                      <m:sSubPr>
+                        <m:ctrlPr>
+                          <a:rPr lang="fr-FR" b="0" i="1" smtClean="0">
+                            <a:latin typeface="Cambria Math"/>
+                          </a:rPr>
+                        </m:ctrlPr>
+                      </m:sSubPr>
+                      <m:e>
+                        <m:r>
+                          <a:rPr lang="fr-FR" b="0" i="1" smtClean="0">
+                            <a:latin typeface="Cambria Math"/>
+                          </a:rPr>
+                          <m:t>𝑓</m:t>
+                        </m:r>
+                      </m:e>
+                      <m:sub>
+                        <m:r>
+                          <a:rPr lang="fr-FR" b="0" i="1" smtClean="0">
+                            <a:latin typeface="Cambria Math"/>
+                          </a:rPr>
+                          <m:t>𝑣</m:t>
+                        </m:r>
+                      </m:sub>
+                    </m:sSub>
+                    <m:sSub>
+                      <m:sSubPr>
+                        <m:ctrlPr>
+                          <a:rPr lang="fr-FR" b="0" i="1" smtClean="0">
+                            <a:latin typeface="Cambria Math"/>
+                          </a:rPr>
+                        </m:ctrlPr>
+                      </m:sSubPr>
+                      <m:e>
+                        <m:r>
+                          <a:rPr lang="fr-FR" b="0" i="1" smtClean="0">
+                            <a:latin typeface="Cambria Math"/>
+                          </a:rPr>
+                          <m:t>𝜔</m:t>
+                        </m:r>
+                      </m:e>
+                      <m:sub>
+                        <m:r>
+                          <a:rPr lang="fr-FR" b="0" i="1" smtClean="0">
+                            <a:latin typeface="Cambria Math"/>
+                          </a:rPr>
+                          <m:t>𝑚</m:t>
+                        </m:r>
+                      </m:sub>
+                    </m:sSub>
+                    <m:r>
+                      <a:rPr lang="fr-FR" b="0" i="1" smtClean="0">
+                        <a:latin typeface="Cambria Math"/>
+                      </a:rPr>
+                      <m:t>(</m:t>
+                    </m:r>
+                    <m:r>
+                      <a:rPr lang="fr-FR" b="0" i="1" smtClean="0">
+                        <a:latin typeface="Cambria Math"/>
+                      </a:rPr>
+                      <m:t>𝑡</m:t>
+                    </m:r>
+                    <m:r>
+                      <a:rPr lang="fr-FR" b="0" i="1" smtClean="0">
+                        <a:latin typeface="Cambria Math"/>
+                      </a:rPr>
+                      <m:t>)</m:t>
+                    </m:r>
+                  </m:oMath>
+                </a14:m>
+                <a:endParaRPr lang="fr-FR" dirty="0" smtClean="0"/>
+              </a:p>
+              <a:p>
+                <a:r>
+                  <a:rPr lang="fr-FR" dirty="0" smtClean="0"/>
+                  <a:t>Équation électro mécanique</a:t>
+                </a:r>
+              </a:p>
+              <a:p>
+                <a:pPr lvl="2"/>
+                <a14:m>
+                  <m:oMath xmlns:m="http://schemas.openxmlformats.org/officeDocument/2006/math">
+                    <m:r>
+                      <a:rPr lang="fr-FR" b="0" i="1" smtClean="0">
+                        <a:latin typeface="Cambria Math"/>
+                      </a:rPr>
+                      <m:t>𝑒</m:t>
+                    </m:r>
+                    <m:d>
+                      <m:dPr>
+                        <m:ctrlPr>
+                          <a:rPr lang="fr-FR" b="0" i="1" smtClean="0">
+                            <a:latin typeface="Cambria Math"/>
+                          </a:rPr>
+                        </m:ctrlPr>
+                      </m:dPr>
+                      <m:e>
+                        <m:r>
+                          <a:rPr lang="fr-FR" b="0" i="1" smtClean="0">
+                            <a:latin typeface="Cambria Math"/>
+                          </a:rPr>
+                          <m:t>𝑡</m:t>
+                        </m:r>
+                      </m:e>
+                    </m:d>
+                    <m:r>
+                      <a:rPr lang="fr-FR" b="0" i="1" smtClean="0">
+                        <a:latin typeface="Cambria Math"/>
+                      </a:rPr>
+                      <m:t>=</m:t>
+                    </m:r>
+                    <m:sSub>
+                      <m:sSubPr>
+                        <m:ctrlPr>
+                          <a:rPr lang="fr-FR" b="0" i="1" smtClean="0">
+                            <a:latin typeface="Cambria Math"/>
+                          </a:rPr>
+                        </m:ctrlPr>
+                      </m:sSubPr>
+                      <m:e>
+                        <m:r>
+                          <a:rPr lang="fr-FR" b="0" i="1" smtClean="0">
+                            <a:latin typeface="Cambria Math"/>
+                          </a:rPr>
+                          <m:t>𝐾</m:t>
+                        </m:r>
+                      </m:e>
+                      <m:sub>
+                        <m:r>
+                          <a:rPr lang="fr-FR" b="0" i="1" smtClean="0">
+                            <a:latin typeface="Cambria Math"/>
+                          </a:rPr>
+                          <m:t>𝐸</m:t>
+                        </m:r>
+                      </m:sub>
+                    </m:sSub>
+                    <m:sSub>
+                      <m:sSubPr>
+                        <m:ctrlPr>
+                          <a:rPr lang="fr-FR" b="0" i="1" smtClean="0">
+                            <a:latin typeface="Cambria Math"/>
+                          </a:rPr>
+                        </m:ctrlPr>
+                      </m:sSubPr>
+                      <m:e>
+                        <m:r>
+                          <a:rPr lang="fr-FR" b="0" i="1" smtClean="0">
+                            <a:latin typeface="Cambria Math"/>
+                          </a:rPr>
+                          <m:t>𝜔</m:t>
+                        </m:r>
+                      </m:e>
+                      <m:sub>
+                        <m:r>
+                          <a:rPr lang="fr-FR" b="0" i="1" smtClean="0">
+                            <a:latin typeface="Cambria Math"/>
+                          </a:rPr>
+                          <m:t>𝑚</m:t>
+                        </m:r>
+                      </m:sub>
+                    </m:sSub>
+                    <m:d>
+                      <m:dPr>
+                        <m:ctrlPr>
+                          <a:rPr lang="fr-FR" b="0" i="1" smtClean="0">
+                            <a:latin typeface="Cambria Math"/>
+                          </a:rPr>
+                        </m:ctrlPr>
+                      </m:dPr>
+                      <m:e>
+                        <m:r>
+                          <a:rPr lang="fr-FR" b="0" i="1" smtClean="0">
+                            <a:latin typeface="Cambria Math"/>
+                          </a:rPr>
+                          <m:t>𝑡</m:t>
+                        </m:r>
+                      </m:e>
+                    </m:d>
+                  </m:oMath>
+                </a14:m>
+                <a:endParaRPr lang="fr-FR" b="0" dirty="0" smtClean="0"/>
+              </a:p>
+              <a:p>
+                <a:pPr lvl="2"/>
+                <a14:m>
+                  <m:oMath xmlns:m="http://schemas.openxmlformats.org/officeDocument/2006/math">
+                    <m:sSub>
+                      <m:sSubPr>
+                        <m:ctrlPr>
+                          <a:rPr lang="fr-FR" b="0" i="1" smtClean="0">
+                            <a:latin typeface="Cambria Math"/>
+                          </a:rPr>
+                        </m:ctrlPr>
+                      </m:sSubPr>
+                      <m:e>
+                        <m:r>
+                          <a:rPr lang="fr-FR" b="0" i="1" smtClean="0">
+                            <a:latin typeface="Cambria Math"/>
+                          </a:rPr>
+                          <m:t>𝑐</m:t>
+                        </m:r>
+                      </m:e>
+                      <m:sub>
+                        <m:r>
+                          <a:rPr lang="fr-FR" b="0" i="1" smtClean="0">
+                            <a:latin typeface="Cambria Math"/>
+                          </a:rPr>
+                          <m:t>𝑚</m:t>
+                        </m:r>
+                      </m:sub>
+                    </m:sSub>
+                    <m:d>
+                      <m:dPr>
+                        <m:ctrlPr>
+                          <a:rPr lang="fr-FR" b="0" i="1" smtClean="0">
+                            <a:latin typeface="Cambria Math"/>
+                          </a:rPr>
+                        </m:ctrlPr>
+                      </m:dPr>
+                      <m:e>
+                        <m:r>
+                          <a:rPr lang="fr-FR" b="0" i="1" smtClean="0">
+                            <a:latin typeface="Cambria Math"/>
+                          </a:rPr>
+                          <m:t>𝑡</m:t>
+                        </m:r>
+                      </m:e>
+                    </m:d>
+                    <m:r>
+                      <a:rPr lang="fr-FR" b="0" i="1" smtClean="0">
+                        <a:latin typeface="Cambria Math"/>
+                      </a:rPr>
+                      <m:t>=</m:t>
+                    </m:r>
+                    <m:sSub>
+                      <m:sSubPr>
+                        <m:ctrlPr>
+                          <a:rPr lang="fr-FR" b="0" i="1" smtClean="0">
+                            <a:latin typeface="Cambria Math"/>
+                          </a:rPr>
+                        </m:ctrlPr>
+                      </m:sSubPr>
+                      <m:e>
+                        <m:r>
+                          <a:rPr lang="fr-FR" b="0" i="1" smtClean="0">
+                            <a:latin typeface="Cambria Math"/>
+                          </a:rPr>
+                          <m:t>𝐾</m:t>
+                        </m:r>
+                      </m:e>
+                      <m:sub>
+                        <m:r>
+                          <a:rPr lang="fr-FR" b="0" i="1" smtClean="0">
+                            <a:latin typeface="Cambria Math"/>
+                          </a:rPr>
+                          <m:t>𝐶</m:t>
+                        </m:r>
+                      </m:sub>
+                    </m:sSub>
+                    <m:r>
+                      <a:rPr lang="fr-FR" b="0" i="1" smtClean="0">
+                        <a:latin typeface="Cambria Math"/>
+                      </a:rPr>
+                      <m:t>𝑖</m:t>
+                    </m:r>
+                    <m:d>
+                      <m:dPr>
+                        <m:ctrlPr>
+                          <a:rPr lang="fr-FR" b="0" i="1" smtClean="0">
+                            <a:latin typeface="Cambria Math"/>
+                          </a:rPr>
+                        </m:ctrlPr>
+                      </m:dPr>
+                      <m:e>
+                        <m:r>
+                          <a:rPr lang="fr-FR" b="0" i="1" smtClean="0">
+                            <a:latin typeface="Cambria Math"/>
+                          </a:rPr>
+                          <m:t>𝑡</m:t>
+                        </m:r>
+                      </m:e>
+                    </m:d>
+                  </m:oMath>
+                </a14:m>
+                <a:endParaRPr lang="fr-FR" dirty="0" smtClean="0"/>
+              </a:p>
+              <a:p>
+                <a:r>
+                  <a:rPr lang="fr-FR" dirty="0" smtClean="0"/>
+                  <a:t>Phénomène non linéaires</a:t>
+                </a:r>
+              </a:p>
+              <a:p>
+                <a:pPr lvl="1"/>
+                <a:r>
+                  <a:rPr lang="fr-FR" dirty="0" smtClean="0"/>
+                  <a:t>Saturation du courant</a:t>
+                </a:r>
+              </a:p>
+              <a:p>
+                <a:pPr lvl="2"/>
+                <a14:m>
+                  <m:oMath xmlns:m="http://schemas.openxmlformats.org/officeDocument/2006/math">
+                    <m:r>
+                      <a:rPr lang="fr-FR" b="0" i="1" smtClean="0">
+                        <a:latin typeface="Cambria Math"/>
+                      </a:rPr>
+                      <m:t>−</m:t>
+                    </m:r>
+                    <m:sSub>
+                      <m:sSubPr>
+                        <m:ctrlPr>
+                          <a:rPr lang="fr-FR" b="0" i="1" smtClean="0">
+                            <a:latin typeface="Cambria Math"/>
+                          </a:rPr>
+                        </m:ctrlPr>
+                      </m:sSubPr>
+                      <m:e>
+                        <m:r>
+                          <a:rPr lang="fr-FR" b="0" i="1" smtClean="0">
+                            <a:latin typeface="Cambria Math"/>
+                          </a:rPr>
+                          <m:t>𝑖</m:t>
+                        </m:r>
+                      </m:e>
+                      <m:sub>
+                        <m:r>
+                          <a:rPr lang="fr-FR" b="0" i="1" smtClean="0">
+                            <a:latin typeface="Cambria Math"/>
+                          </a:rPr>
+                          <m:t>𝑆</m:t>
+                        </m:r>
+                      </m:sub>
+                    </m:sSub>
+                    <m:r>
+                      <a:rPr lang="fr-FR" b="0" i="1" smtClean="0">
+                        <a:latin typeface="Cambria Math"/>
+                      </a:rPr>
+                      <m:t>≤</m:t>
+                    </m:r>
+                    <m:r>
+                      <a:rPr lang="fr-FR" b="0" i="1" smtClean="0">
+                        <a:latin typeface="Cambria Math"/>
+                      </a:rPr>
+                      <m:t>𝑖</m:t>
+                    </m:r>
+                    <m:d>
+                      <m:dPr>
+                        <m:ctrlPr>
+                          <a:rPr lang="fr-FR" b="0" i="1" smtClean="0">
+                            <a:latin typeface="Cambria Math"/>
+                          </a:rPr>
+                        </m:ctrlPr>
+                      </m:dPr>
+                      <m:e>
+                        <m:r>
+                          <a:rPr lang="fr-FR" b="0" i="1" smtClean="0">
+                            <a:latin typeface="Cambria Math"/>
+                          </a:rPr>
+                          <m:t>𝑡</m:t>
+                        </m:r>
+                      </m:e>
+                    </m:d>
+                    <m:r>
+                      <a:rPr lang="fr-FR" b="0" i="1" smtClean="0">
+                        <a:latin typeface="Cambria Math"/>
+                      </a:rPr>
+                      <m:t>≤</m:t>
+                    </m:r>
+                    <m:sSub>
+                      <m:sSubPr>
+                        <m:ctrlPr>
+                          <a:rPr lang="fr-FR" b="0" i="1" smtClean="0">
+                            <a:latin typeface="Cambria Math"/>
+                          </a:rPr>
+                        </m:ctrlPr>
+                      </m:sSubPr>
+                      <m:e>
+                        <m:r>
+                          <a:rPr lang="fr-FR" b="0" i="1" smtClean="0">
+                            <a:latin typeface="Cambria Math"/>
+                          </a:rPr>
+                          <m:t>𝑖</m:t>
+                        </m:r>
+                      </m:e>
+                      <m:sub>
+                        <m:r>
+                          <a:rPr lang="fr-FR" b="0" i="1" smtClean="0">
+                            <a:latin typeface="Cambria Math"/>
+                          </a:rPr>
+                          <m:t>𝑆</m:t>
+                        </m:r>
+                      </m:sub>
+                    </m:sSub>
+                  </m:oMath>
+                </a14:m>
+                <a:endParaRPr lang="fr-FR" dirty="0" smtClean="0"/>
+              </a:p>
+            </p:txBody>
+          </p:sp>
+        </mc:Choice>
+        <mc:Fallback>
+          <p:sp>
+            <p:nvSpPr>
+              <p:cNvPr id="5" name="Espace réservé du contenu 4"/>
+              <p:cNvSpPr>
+                <a:spLocks noGrp="1" noRot="1" noChangeAspect="1" noMove="1" noResize="1" noEditPoints="1" noAdjustHandles="1" noChangeArrowheads="1" noChangeShapeType="1" noTextEdit="1"/>
+              </p:cNvSpPr>
+              <p:nvPr>
+                <p:ph sz="quarter" idx="1"/>
+              </p:nvPr>
+            </p:nvSpPr>
+            <p:spPr>
+              <a:blipFill rotWithShape="1">
+                <a:blip r:embed="rId2"/>
+                <a:stretch>
+                  <a:fillRect l="-77" t="-585"/>
+                </a:stretch>
+              </a:blipFill>
+            </p:spPr>
+            <p:txBody>
+              <a:bodyPr/>
+              <a:lstStyle/>
+              <a:p>
+                <a:r>
+                  <a:rPr lang="fr-FR">
+                    <a:noFill/>
+                  </a:rPr>
+                  <a:t> </a:t>
+                </a:r>
+              </a:p>
+            </p:txBody>
+          </p:sp>
+        </mc:Fallback>
+      </mc:AlternateContent>
       <p:sp>
         <p:nvSpPr>
           <p:cNvPr id="4" name="Espace réservé du numéro de diapositive 3"/>
@@ -10158,10 +11474,255 @@
           </a:p>
         </p:txBody>
       </p:sp>
+      <p:pic>
+        <p:nvPicPr>
+          <p:cNvPr id="2051" name="Picture 3"/>
+          <p:cNvPicPr>
+            <a:picLocks noChangeAspect="1" noChangeArrowheads="1"/>
+          </p:cNvPicPr>
+          <p:nvPr/>
+        </p:nvPicPr>
+        <p:blipFill>
+          <a:blip r:embed="rId3" cstate="print">
+            <a:extLst>
+              <a:ext uri="{28A0092B-C50C-407E-A947-70E740481C1C}">
+                <a14:useLocalDpi xmlns:a14="http://schemas.microsoft.com/office/drawing/2010/main" val="0"/>
+              </a:ext>
+            </a:extLst>
+          </a:blip>
+          <a:srcRect/>
+          <a:stretch>
+            <a:fillRect/>
+          </a:stretch>
+        </p:blipFill>
+        <p:spPr bwMode="auto">
+          <a:xfrm>
+            <a:off x="7968744" y="-3123"/>
+            <a:ext cx="1175256" cy="1343891"/>
+          </a:xfrm>
+          <a:prstGeom prst="rect">
+            <a:avLst/>
+          </a:prstGeom>
+          <a:ln>
+            <a:noFill/>
+          </a:ln>
+          <a:effectLst>
+            <a:outerShdw blurRad="292100" dist="139700" dir="2700000" algn="tl" rotWithShape="0">
+              <a:srgbClr val="333333">
+                <a:alpha val="65000"/>
+              </a:srgbClr>
+            </a:outerShdw>
+          </a:effectLst>
+          <a:extLst>
+            <a:ext uri="{909E8E84-426E-40DD-AFC4-6F175D3DCCD1}">
+              <a14:hiddenFill xmlns:a14="http://schemas.microsoft.com/office/drawing/2010/main">
+                <a:solidFill>
+                  <a:schemeClr val="accent1"/>
+                </a:solidFill>
+              </a14:hiddenFill>
+            </a:ext>
+            <a:ext uri="{91240B29-F687-4F45-9708-019B960494DF}">
+              <a14:hiddenLine xmlns:a14="http://schemas.microsoft.com/office/drawing/2010/main" w="9525">
+                <a:solidFill>
+                  <a:schemeClr val="tx1"/>
+                </a:solidFill>
+                <a:miter lim="800000"/>
+                <a:headEnd/>
+                <a:tailEnd/>
+              </a14:hiddenLine>
+            </a:ext>
+            <a:ext uri="{AF507438-7753-43E0-B8FC-AC1667EBCBE1}">
+              <a14:hiddenEffects xmlns:a14="http://schemas.microsoft.com/office/drawing/2010/main">
+                <a:effectLst>
+                  <a:outerShdw dist="35921" dir="2700000" algn="ctr" rotWithShape="0">
+                    <a:schemeClr val="bg2"/>
+                  </a:outerShdw>
+                </a:effectLst>
+              </a14:hiddenEffects>
+            </a:ext>
+          </a:extLst>
+        </p:spPr>
+      </p:pic>
+      <p:pic>
+        <p:nvPicPr>
+          <p:cNvPr id="2052" name="Picture 4"/>
+          <p:cNvPicPr>
+            <a:picLocks noChangeAspect="1" noChangeArrowheads="1"/>
+          </p:cNvPicPr>
+          <p:nvPr/>
+        </p:nvPicPr>
+        <p:blipFill>
+          <a:blip r:embed="rId4">
+            <a:extLst>
+              <a:ext uri="{28A0092B-C50C-407E-A947-70E740481C1C}">
+                <a14:useLocalDpi xmlns:a14="http://schemas.microsoft.com/office/drawing/2010/main" val="0"/>
+              </a:ext>
+            </a:extLst>
+          </a:blip>
+          <a:srcRect/>
+          <a:stretch>
+            <a:fillRect/>
+          </a:stretch>
+        </p:blipFill>
+        <p:spPr bwMode="auto">
+          <a:xfrm>
+            <a:off x="4556364" y="1124744"/>
+            <a:ext cx="3922328" cy="1555545"/>
+          </a:xfrm>
+          <a:prstGeom prst="rect">
+            <a:avLst/>
+          </a:prstGeom>
+          <a:ln>
+            <a:noFill/>
+          </a:ln>
+          <a:effectLst>
+            <a:outerShdw blurRad="292100" dist="139700" dir="2700000" algn="tl" rotWithShape="0">
+              <a:srgbClr val="333333">
+                <a:alpha val="65000"/>
+              </a:srgbClr>
+            </a:outerShdw>
+          </a:effectLst>
+          <a:extLst>
+            <a:ext uri="{909E8E84-426E-40DD-AFC4-6F175D3DCCD1}">
+              <a14:hiddenFill xmlns:a14="http://schemas.microsoft.com/office/drawing/2010/main">
+                <a:solidFill>
+                  <a:schemeClr val="accent1"/>
+                </a:solidFill>
+              </a14:hiddenFill>
+            </a:ext>
+            <a:ext uri="{91240B29-F687-4F45-9708-019B960494DF}">
+              <a14:hiddenLine xmlns:a14="http://schemas.microsoft.com/office/drawing/2010/main" w="9525">
+                <a:solidFill>
+                  <a:schemeClr val="tx1"/>
+                </a:solidFill>
+                <a:miter lim="800000"/>
+                <a:headEnd/>
+                <a:tailEnd/>
+              </a14:hiddenLine>
+            </a:ext>
+            <a:ext uri="{AF507438-7753-43E0-B8FC-AC1667EBCBE1}">
+              <a14:hiddenEffects xmlns:a14="http://schemas.microsoft.com/office/drawing/2010/main">
+                <a:effectLst>
+                  <a:outerShdw dist="35921" dir="2700000" algn="ctr" rotWithShape="0">
+                    <a:schemeClr val="bg2"/>
+                  </a:outerShdw>
+                </a:effectLst>
+              </a14:hiddenEffects>
+            </a:ext>
+          </a:extLst>
+        </p:spPr>
+      </p:pic>
+      <p:pic>
+        <p:nvPicPr>
+          <p:cNvPr id="3074" name="Picture 2"/>
+          <p:cNvPicPr>
+            <a:picLocks noChangeAspect="1" noChangeArrowheads="1"/>
+          </p:cNvPicPr>
+          <p:nvPr/>
+        </p:nvPicPr>
+        <p:blipFill>
+          <a:blip r:embed="rId5">
+            <a:extLst>
+              <a:ext uri="{28A0092B-C50C-407E-A947-70E740481C1C}">
+                <a14:useLocalDpi xmlns:a14="http://schemas.microsoft.com/office/drawing/2010/main" val="0"/>
+              </a:ext>
+            </a:extLst>
+          </a:blip>
+          <a:srcRect/>
+          <a:stretch>
+            <a:fillRect/>
+          </a:stretch>
+        </p:blipFill>
+        <p:spPr bwMode="auto">
+          <a:xfrm>
+            <a:off x="4215615" y="4221088"/>
+            <a:ext cx="4603825" cy="1825818"/>
+          </a:xfrm>
+          <a:prstGeom prst="rect">
+            <a:avLst/>
+          </a:prstGeom>
+          <a:ln>
+            <a:noFill/>
+          </a:ln>
+          <a:effectLst>
+            <a:outerShdw blurRad="292100" dist="139700" dir="2700000" algn="tl" rotWithShape="0">
+              <a:srgbClr val="333333">
+                <a:alpha val="65000"/>
+              </a:srgbClr>
+            </a:outerShdw>
+          </a:effectLst>
+          <a:extLst>
+            <a:ext uri="{909E8E84-426E-40DD-AFC4-6F175D3DCCD1}">
+              <a14:hiddenFill xmlns:a14="http://schemas.microsoft.com/office/drawing/2010/main">
+                <a:solidFill>
+                  <a:schemeClr val="accent1"/>
+                </a:solidFill>
+              </a14:hiddenFill>
+            </a:ext>
+            <a:ext uri="{91240B29-F687-4F45-9708-019B960494DF}">
+              <a14:hiddenLine xmlns:a14="http://schemas.microsoft.com/office/drawing/2010/main" w="9525">
+                <a:solidFill>
+                  <a:schemeClr val="tx1"/>
+                </a:solidFill>
+                <a:miter lim="800000"/>
+                <a:headEnd/>
+                <a:tailEnd/>
+              </a14:hiddenLine>
+            </a:ext>
+            <a:ext uri="{AF507438-7753-43E0-B8FC-AC1667EBCBE1}">
+              <a14:hiddenEffects xmlns:a14="http://schemas.microsoft.com/office/drawing/2010/main">
+                <a:effectLst>
+                  <a:outerShdw dist="35921" dir="2700000" algn="ctr" rotWithShape="0">
+                    <a:schemeClr val="bg2"/>
+                  </a:outerShdw>
+                </a:effectLst>
+              </a14:hiddenEffects>
+            </a:ext>
+          </a:extLst>
+        </p:spPr>
+      </p:pic>
+      <p:sp>
+        <p:nvSpPr>
+          <p:cNvPr id="7" name="Flèche vers le bas 6"/>
+          <p:cNvSpPr/>
+          <p:nvPr/>
+        </p:nvSpPr>
+        <p:spPr>
+          <a:xfrm>
+            <a:off x="6517528" y="2996952"/>
+            <a:ext cx="430736" cy="720080"/>
+          </a:xfrm>
+          <a:prstGeom prst="downArrow">
+            <a:avLst/>
+          </a:prstGeom>
+        </p:spPr>
+        <p:style>
+          <a:lnRef idx="1">
+            <a:schemeClr val="accent1"/>
+          </a:lnRef>
+          <a:fillRef idx="2">
+            <a:schemeClr val="accent1"/>
+          </a:fillRef>
+          <a:effectRef idx="1">
+            <a:schemeClr val="accent1"/>
+          </a:effectRef>
+          <a:fontRef idx="minor">
+            <a:schemeClr val="dk1"/>
+          </a:fontRef>
+        </p:style>
+        <p:txBody>
+          <a:bodyPr rtlCol="0" anchor="ctr"/>
+          <a:lstStyle/>
+          <a:p>
+            <a:pPr algn="ctr"/>
+            <a:endParaRPr lang="fr-FR"/>
+          </a:p>
+        </p:txBody>
+      </p:sp>
     </p:spTree>
     <p:extLst>
       <p:ext uri="{BB962C8B-B14F-4D97-AF65-F5344CB8AC3E}">
-        <p14:creationId xmlns:p14="http://schemas.microsoft.com/office/powerpoint/2010/main" val="3594615262"/>
+        <p14:creationId xmlns:p14="http://schemas.microsoft.com/office/powerpoint/2010/main" val="1891766453"/>
       </p:ext>
     </p:extLst>
   </p:cSld>
@@ -10201,21 +11762,22 @@
         <p:spPr/>
         <p:txBody>
           <a:bodyPr>
-            <a:noAutofit/>
+            <a:normAutofit fontScale="90000"/>
           </a:bodyPr>
           <a:lstStyle/>
           <a:p>
             <a:r>
-              <a:rPr lang="fr-FR" sz="2400" dirty="0"/>
+              <a:rPr lang="fr-FR" dirty="0" smtClean="0"/>
               <a:t>Modélisation multiphysique</a:t>
             </a:r>
             <a:br>
-              <a:rPr lang="fr-FR" sz="2400" dirty="0"/>
+              <a:rPr lang="fr-FR" dirty="0" smtClean="0"/>
             </a:br>
             <a:r>
-              <a:rPr lang="fr-FR" sz="2400" dirty="0"/>
-              <a:t>Modélisation Causale/ Modélisation Acausale</a:t>
-            </a:r>
+              <a:rPr lang="fr-FR" dirty="0" smtClean="0"/>
+              <a:t>Enjeux</a:t>
+            </a:r>
+            <a:endParaRPr lang="fr-FR" dirty="0"/>
           </a:p>
         </p:txBody>
       </p:sp>
@@ -10236,7 +11798,7 @@
           <a:p>
             <a:r>
               <a:rPr lang="fr-FR" dirty="0" smtClean="0"/>
-              <a:t>Représentation graphique de modèles causaux et acausaux</a:t>
+              <a:t>Pouvoir simuler le comportement d’un système dans sa globalité </a:t>
             </a:r>
             <a:endParaRPr lang="fr-FR" dirty="0"/>
           </a:p>
@@ -10268,7 +11830,7 @@
     </p:spTree>
     <p:extLst>
       <p:ext uri="{BB962C8B-B14F-4D97-AF65-F5344CB8AC3E}">
-        <p14:creationId xmlns:p14="http://schemas.microsoft.com/office/powerpoint/2010/main" val="386149566"/>
+        <p14:creationId xmlns:p14="http://schemas.microsoft.com/office/powerpoint/2010/main" val="1601485309"/>
       </p:ext>
     </p:extLst>
   </p:cSld>

</xml_diff>